<commit_message>
0702-025 Feedback from Anthony
</commit_message>
<xml_diff>
--- a/slides/AdaCore_Tech_Days_2015/AdaCore Tech Days SPARK 2014.pptx
+++ b/slides/AdaCore_Tech_Days_2015/AdaCore Tech Days SPARK 2014.pptx
@@ -275,7 +275,7 @@
             <a:fld id="{D83FDC75-7F73-4A4A-A77C-09AADF00E0EA}" type="datetimeFigureOut">
               <a:rPr lang="en-US" smtClean="0"/>
               <a:pPr/>
-              <a:t>30/07/15</a:t>
+              <a:t>31/07/15</a:t>
             </a:fld>
             <a:endParaRPr lang="en-US" dirty="0"/>
           </a:p>
@@ -442,7 +442,7 @@
             <a:fld id="{48AEF76B-3757-4A0B-AF93-28494465C1DD}" type="datetimeFigureOut">
               <a:rPr lang="en-US" smtClean="0"/>
               <a:pPr/>
-              <a:t>30/07/15</a:t>
+              <a:t>31/07/15</a:t>
             </a:fld>
             <a:endParaRPr lang="en-US" dirty="0"/>
           </a:p>
@@ -1488,7 +1488,7 @@
             <a:fld id="{757B281C-5159-4971-8228-52B9A72E9ED2}" type="datetimeFigureOut">
               <a:rPr lang="en-US" smtClean="0"/>
               <a:pPr/>
-              <a:t>30/07/15</a:t>
+              <a:t>31/07/15</a:t>
             </a:fld>
             <a:endParaRPr lang="en-US" dirty="0"/>
           </a:p>
@@ -1606,7 +1606,7 @@
             <a:fld id="{757B281C-5159-4971-8228-52B9A72E9ED2}" type="datetimeFigureOut">
               <a:rPr lang="en-US" smtClean="0"/>
               <a:pPr/>
-              <a:t>30/07/15</a:t>
+              <a:t>31/07/15</a:t>
             </a:fld>
             <a:endParaRPr lang="en-US" dirty="0"/>
           </a:p>
@@ -1708,7 +1708,7 @@
             <a:fld id="{757B281C-5159-4971-8228-52B9A72E9ED2}" type="datetimeFigureOut">
               <a:rPr lang="en-US" smtClean="0"/>
               <a:pPr/>
-              <a:t>30/07/15</a:t>
+              <a:t>31/07/15</a:t>
             </a:fld>
             <a:endParaRPr lang="en-US" dirty="0"/>
           </a:p>
@@ -1815,7 +1815,7 @@
             <a:fld id="{757B281C-5159-4971-8228-52B9A72E9ED2}" type="datetimeFigureOut">
               <a:rPr lang="en-US" smtClean="0"/>
               <a:pPr/>
-              <a:t>30/07/15</a:t>
+              <a:t>31/07/15</a:t>
             </a:fld>
             <a:endParaRPr lang="en-US" dirty="0"/>
           </a:p>
@@ -1927,7 +1927,7 @@
             <a:fld id="{757B281C-5159-4971-8228-52B9A72E9ED2}" type="datetimeFigureOut">
               <a:rPr lang="en-US" smtClean="0"/>
               <a:pPr/>
-              <a:t>30/07/15</a:t>
+              <a:t>31/07/15</a:t>
             </a:fld>
             <a:endParaRPr lang="en-US" dirty="0"/>
           </a:p>
@@ -2067,7 +2067,7 @@
             <a:fld id="{757B281C-5159-4971-8228-52B9A72E9ED2}" type="datetimeFigureOut">
               <a:rPr lang="en-US" smtClean="0"/>
               <a:pPr/>
-              <a:t>30/07/15</a:t>
+              <a:t>31/07/15</a:t>
             </a:fld>
             <a:endParaRPr lang="en-US" dirty="0"/>
           </a:p>
@@ -2339,7 +2339,7 @@
             <a:fld id="{757B281C-5159-4971-8228-52B9A72E9ED2}" type="datetimeFigureOut">
               <a:rPr lang="en-US" smtClean="0"/>
               <a:pPr/>
-              <a:t>30/07/15</a:t>
+              <a:t>31/07/15</a:t>
             </a:fld>
             <a:endParaRPr lang="en-US" dirty="0"/>
           </a:p>
@@ -2655,7 +2655,7 @@
             <a:fld id="{757B281C-5159-4971-8228-52B9A72E9ED2}" type="datetimeFigureOut">
               <a:rPr lang="en-US" smtClean="0"/>
               <a:pPr/>
-              <a:t>30/07/15</a:t>
+              <a:t>31/07/15</a:t>
             </a:fld>
             <a:endParaRPr lang="en-US" dirty="0"/>
           </a:p>
@@ -3100,7 +3100,7 @@
             <a:fld id="{757B281C-5159-4971-8228-52B9A72E9ED2}" type="datetimeFigureOut">
               <a:rPr lang="en-US" smtClean="0"/>
               <a:pPr/>
-              <a:t>30/07/15</a:t>
+              <a:t>31/07/15</a:t>
             </a:fld>
             <a:endParaRPr lang="en-US" dirty="0"/>
           </a:p>
@@ -3379,7 +3379,7 @@
             <a:fld id="{757B281C-5159-4971-8228-52B9A72E9ED2}" type="datetimeFigureOut">
               <a:rPr lang="en-US" smtClean="0"/>
               <a:pPr/>
-              <a:t>30/07/15</a:t>
+              <a:t>31/07/15</a:t>
             </a:fld>
             <a:endParaRPr lang="en-US" dirty="0"/>
           </a:p>
@@ -3643,7 +3643,7 @@
             <a:fld id="{757B281C-5159-4971-8228-52B9A72E9ED2}" type="datetimeFigureOut">
               <a:rPr lang="en-US" smtClean="0"/>
               <a:pPr/>
-              <a:t>30/07/15</a:t>
+              <a:t>31/07/15</a:t>
             </a:fld>
             <a:endParaRPr lang="en-US" dirty="0"/>
           </a:p>
@@ -3813,7 +3813,7 @@
             <a:fld id="{757B281C-5159-4971-8228-52B9A72E9ED2}" type="datetimeFigureOut">
               <a:rPr lang="en-US" smtClean="0"/>
               <a:pPr/>
-              <a:t>30/07/15</a:t>
+              <a:t>31/07/15</a:t>
             </a:fld>
             <a:endParaRPr lang="en-US" dirty="0"/>
           </a:p>
@@ -4026,7 +4026,7 @@
             <a:fld id="{757B281C-5159-4971-8228-52B9A72E9ED2}" type="datetimeFigureOut">
               <a:rPr lang="en-US" smtClean="0"/>
               <a:pPr/>
-              <a:t>30/07/15</a:t>
+              <a:t>31/07/15</a:t>
             </a:fld>
             <a:endParaRPr lang="en-US" dirty="0"/>
           </a:p>
@@ -5397,15 +5397,7 @@
             <a:pPr lvl="1"/>
             <a:r>
               <a:rPr lang="en-US" dirty="0" smtClean="0"/>
-              <a:t>Generation of </a:t>
-            </a:r>
-            <a:r>
-              <a:rPr lang="en-US" dirty="0" smtClean="0"/>
-              <a:t>counterexamples </a:t>
-            </a:r>
-            <a:r>
-              <a:rPr lang="en-US" dirty="0" smtClean="0"/>
-              <a:t>when not proved </a:t>
+              <a:t>Generation of counterexamples when not proved </a:t>
             </a:r>
           </a:p>
         </p:txBody>
@@ -5614,15 +5606,7 @@
             <a:pPr lvl="1"/>
             <a:r>
               <a:rPr lang="en-US" b="1" dirty="0" smtClean="0"/>
-              <a:t>Generation of </a:t>
-            </a:r>
-            <a:r>
-              <a:rPr lang="en-US" b="1" dirty="0" smtClean="0"/>
-              <a:t>counterexamples </a:t>
-            </a:r>
-            <a:r>
-              <a:rPr lang="en-US" b="1" dirty="0" smtClean="0"/>
-              <a:t>when not proved </a:t>
+              <a:t>Generation of counterexamples when not proved </a:t>
             </a:r>
           </a:p>
         </p:txBody>
@@ -9198,11 +9182,7 @@
           <a:p>
             <a:r>
               <a:rPr lang="en-US" dirty="0" smtClean="0"/>
-              <a:t>Generation of </a:t>
-            </a:r>
-            <a:r>
-              <a:rPr lang="en-US" dirty="0" smtClean="0"/>
-              <a:t>Counter</a:t>
+              <a:t>Generation of Counter</a:t>
             </a:r>
             <a:r>
               <a:rPr lang="en-US" dirty="0"/>
@@ -9305,11 +9285,7 @@
           <a:p>
             <a:r>
               <a:rPr lang="en-US" dirty="0" smtClean="0"/>
-              <a:t>Generation of </a:t>
-            </a:r>
-            <a:r>
-              <a:rPr lang="en-US" dirty="0" smtClean="0"/>
-              <a:t>Counter</a:t>
+              <a:t>Generation of Counter</a:t>
             </a:r>
             <a:r>
               <a:rPr lang="en-US" dirty="0"/>
@@ -9571,11 +9547,7 @@
           <a:p>
             <a:r>
               <a:rPr lang="en-US" dirty="0" smtClean="0"/>
-              <a:t>Generation of </a:t>
-            </a:r>
-            <a:r>
-              <a:rPr lang="en-US" dirty="0" smtClean="0"/>
-              <a:t>Counter</a:t>
+              <a:t>Generation of Counter</a:t>
             </a:r>
             <a:r>
               <a:rPr lang="en-US" dirty="0"/>
@@ -9743,11 +9715,7 @@
           <a:p>
             <a:r>
               <a:rPr lang="en-US" dirty="0" smtClean="0"/>
-              <a:t>Generation of </a:t>
-            </a:r>
-            <a:r>
-              <a:rPr lang="en-US" dirty="0" smtClean="0"/>
-              <a:t>Counter</a:t>
+              <a:t>Generation of Counter</a:t>
             </a:r>
             <a:r>
               <a:rPr lang="en-US" dirty="0"/>
@@ -9906,11 +9874,7 @@
           <a:p>
             <a:r>
               <a:rPr lang="en-US" dirty="0" smtClean="0"/>
-              <a:t>Generation of </a:t>
-            </a:r>
-            <a:r>
-              <a:rPr lang="en-US" dirty="0" smtClean="0"/>
-              <a:t>Counter</a:t>
+              <a:t>Generation of Counter</a:t>
             </a:r>
             <a:r>
               <a:rPr lang="en-US" dirty="0"/>
@@ -11468,25 +11432,165 @@
       </p:pic>
       <p:sp>
         <p:nvSpPr>
-          <p:cNvPr id="14" name="Content Placeholder 2"/>
-          <p:cNvSpPr>
-            <a:spLocks noGrp="1"/>
+          <p:cNvPr id="5" name="Content Placeholder 2"/>
+          <p:cNvSpPr txBox="1">
+            <a:spLocks/>
           </p:cNvSpPr>
-          <p:nvPr>
-            <p:ph idx="1"/>
-          </p:nvPr>
+          <p:nvPr/>
         </p:nvSpPr>
         <p:spPr>
           <a:xfrm>
             <a:off x="457200" y="3314700"/>
-            <a:ext cx="3886200" cy="1146156"/>
+            <a:ext cx="3886200" cy="1676400"/>
           </a:xfrm>
+          <a:prstGeom prst="rect">
+            <a:avLst/>
+          </a:prstGeom>
         </p:spPr>
         <p:txBody>
-          <a:bodyPr/>
-          <a:lstStyle/>
+          <a:bodyPr vert="horz" lIns="91440" tIns="45720" rIns="91440" bIns="45720" rtlCol="0">
+            <a:normAutofit/>
+          </a:bodyPr>
+          <a:lstStyle>
+            <a:lvl1pPr marL="342900" indent="-342900" algn="l" defTabSz="914400" rtl="0" eaLnBrk="1" latinLnBrk="0" hangingPunct="1">
+              <a:spcBef>
+                <a:spcPct val="20000"/>
+              </a:spcBef>
+              <a:buFont typeface="Arial" pitchFamily="34" charset="0"/>
+              <a:buChar char="•"/>
+              <a:defRPr sz="2000" kern="1200">
+                <a:solidFill>
+                  <a:schemeClr val="tx1"/>
+                </a:solidFill>
+                <a:latin typeface="Helvetica"/>
+                <a:ea typeface="+mn-ea"/>
+                <a:cs typeface="Helvetica"/>
+              </a:defRPr>
+            </a:lvl1pPr>
+            <a:lvl2pPr marL="742950" indent="-285750" algn="l" defTabSz="914400" rtl="0" eaLnBrk="1" latinLnBrk="0" hangingPunct="1">
+              <a:spcBef>
+                <a:spcPct val="20000"/>
+              </a:spcBef>
+              <a:buFont typeface="Arial" pitchFamily="34" charset="0"/>
+              <a:buChar char="–"/>
+              <a:defRPr sz="2000" kern="1200">
+                <a:solidFill>
+                  <a:schemeClr val="tx1"/>
+                </a:solidFill>
+                <a:latin typeface="Helvetica"/>
+                <a:ea typeface="+mn-ea"/>
+                <a:cs typeface="Helvetica"/>
+              </a:defRPr>
+            </a:lvl2pPr>
+            <a:lvl3pPr marL="1143000" indent="-228600" algn="l" defTabSz="914400" rtl="0" eaLnBrk="1" latinLnBrk="0" hangingPunct="1">
+              <a:spcBef>
+                <a:spcPct val="20000"/>
+              </a:spcBef>
+              <a:buFont typeface="Arial" pitchFamily="34" charset="0"/>
+              <a:buChar char="•"/>
+              <a:defRPr sz="2000" kern="1200">
+                <a:solidFill>
+                  <a:schemeClr val="tx1"/>
+                </a:solidFill>
+                <a:latin typeface="Helvetica"/>
+                <a:ea typeface="+mn-ea"/>
+                <a:cs typeface="Helvetica"/>
+              </a:defRPr>
+            </a:lvl3pPr>
+            <a:lvl4pPr marL="1600200" indent="-228600" algn="l" defTabSz="914400" rtl="0" eaLnBrk="1" latinLnBrk="0" hangingPunct="1">
+              <a:spcBef>
+                <a:spcPct val="20000"/>
+              </a:spcBef>
+              <a:buFont typeface="Arial" pitchFamily="34" charset="0"/>
+              <a:buChar char="–"/>
+              <a:defRPr sz="2000" kern="1200">
+                <a:solidFill>
+                  <a:schemeClr val="tx1"/>
+                </a:solidFill>
+                <a:latin typeface="Helvetica"/>
+                <a:ea typeface="+mn-ea"/>
+                <a:cs typeface="Helvetica"/>
+              </a:defRPr>
+            </a:lvl4pPr>
+            <a:lvl5pPr marL="2057400" indent="-228600" algn="l" defTabSz="914400" rtl="0" eaLnBrk="1" latinLnBrk="0" hangingPunct="1">
+              <a:spcBef>
+                <a:spcPct val="20000"/>
+              </a:spcBef>
+              <a:buFont typeface="Arial" pitchFamily="34" charset="0"/>
+              <a:buChar char="»"/>
+              <a:defRPr sz="2000" kern="1200">
+                <a:solidFill>
+                  <a:schemeClr val="tx1"/>
+                </a:solidFill>
+                <a:latin typeface="Helvetica"/>
+                <a:ea typeface="+mn-ea"/>
+                <a:cs typeface="Helvetica"/>
+              </a:defRPr>
+            </a:lvl5pPr>
+            <a:lvl6pPr marL="2514600" indent="-228600" algn="l" defTabSz="914400" rtl="0" eaLnBrk="1" latinLnBrk="0" hangingPunct="1">
+              <a:spcBef>
+                <a:spcPct val="20000"/>
+              </a:spcBef>
+              <a:buFont typeface="Arial" pitchFamily="34" charset="0"/>
+              <a:buChar char="•"/>
+              <a:defRPr sz="2000" kern="1200">
+                <a:solidFill>
+                  <a:schemeClr val="tx1"/>
+                </a:solidFill>
+                <a:latin typeface="+mn-lt"/>
+                <a:ea typeface="+mn-ea"/>
+                <a:cs typeface="+mn-cs"/>
+              </a:defRPr>
+            </a:lvl6pPr>
+            <a:lvl7pPr marL="2971800" indent="-228600" algn="l" defTabSz="914400" rtl="0" eaLnBrk="1" latinLnBrk="0" hangingPunct="1">
+              <a:spcBef>
+                <a:spcPct val="20000"/>
+              </a:spcBef>
+              <a:buFont typeface="Arial" pitchFamily="34" charset="0"/>
+              <a:buChar char="•"/>
+              <a:defRPr sz="2000" kern="1200">
+                <a:solidFill>
+                  <a:schemeClr val="tx1"/>
+                </a:solidFill>
+                <a:latin typeface="+mn-lt"/>
+                <a:ea typeface="+mn-ea"/>
+                <a:cs typeface="+mn-cs"/>
+              </a:defRPr>
+            </a:lvl7pPr>
+            <a:lvl8pPr marL="3429000" indent="-228600" algn="l" defTabSz="914400" rtl="0" eaLnBrk="1" latinLnBrk="0" hangingPunct="1">
+              <a:spcBef>
+                <a:spcPct val="20000"/>
+              </a:spcBef>
+              <a:buFont typeface="Arial" pitchFamily="34" charset="0"/>
+              <a:buChar char="•"/>
+              <a:defRPr sz="2000" kern="1200">
+                <a:solidFill>
+                  <a:schemeClr val="tx1"/>
+                </a:solidFill>
+                <a:latin typeface="+mn-lt"/>
+                <a:ea typeface="+mn-ea"/>
+                <a:cs typeface="+mn-cs"/>
+              </a:defRPr>
+            </a:lvl8pPr>
+            <a:lvl9pPr marL="3886200" indent="-228600" algn="l" defTabSz="914400" rtl="0" eaLnBrk="1" latinLnBrk="0" hangingPunct="1">
+              <a:spcBef>
+                <a:spcPct val="20000"/>
+              </a:spcBef>
+              <a:buFont typeface="Arial" pitchFamily="34" charset="0"/>
+              <a:buChar char="•"/>
+              <a:defRPr sz="2000" kern="1200">
+                <a:solidFill>
+                  <a:schemeClr val="tx1"/>
+                </a:solidFill>
+                <a:latin typeface="+mn-lt"/>
+                <a:ea typeface="+mn-ea"/>
+                <a:cs typeface="+mn-cs"/>
+              </a:defRPr>
+            </a:lvl9pPr>
+          </a:lstStyle>
           <a:p>
             <a:pPr marL="0" indent="0">
+              <a:buFont typeface="Arial" pitchFamily="34" charset="0"/>
               <a:buNone/>
             </a:pPr>
             <a:r>
@@ -11508,11 +11612,12 @@
           </a:p>
           <a:p>
             <a:pPr marL="0" indent="0">
+              <a:buFont typeface="Arial" pitchFamily="34" charset="0"/>
               <a:buNone/>
             </a:pPr>
             <a:r>
               <a:rPr lang="en-US" dirty="0" smtClean="0"/>
-              <a:t>5900 </a:t>
+              <a:t>1800 </a:t>
             </a:r>
             <a:r>
               <a:rPr lang="en-US" dirty="0" err="1" smtClean="0"/>
@@ -11520,11 +11625,12 @@
             </a:r>
             <a:r>
               <a:rPr lang="en-US" dirty="0" smtClean="0"/>
-              <a:t> firmware in C</a:t>
+              <a:t> navigation in C</a:t>
             </a:r>
           </a:p>
           <a:p>
             <a:pPr marL="0" indent="0">
+              <a:buFont typeface="Arial" pitchFamily="34" charset="0"/>
               <a:buNone/>
             </a:pPr>
             <a:r>
@@ -11534,6 +11640,17 @@
             <a:r>
               <a:rPr lang="en-US" dirty="0" err="1" smtClean="0"/>
               <a:t>FreeRTOS</a:t>
+            </a:r>
+            <a:endParaRPr lang="en-US" dirty="0" smtClean="0"/>
+          </a:p>
+          <a:p>
+            <a:pPr marL="0" indent="0">
+              <a:buFont typeface="Arial" pitchFamily="34" charset="0"/>
+              <a:buNone/>
+            </a:pPr>
+            <a:r>
+              <a:rPr lang="en-US" dirty="0" smtClean="0"/>
+              <a:t>+ …</a:t>
             </a:r>
             <a:endParaRPr lang="en-US" dirty="0"/>
           </a:p>
@@ -11652,11 +11769,13 @@
         <p:spPr>
           <a:xfrm>
             <a:off x="457200" y="3314700"/>
-            <a:ext cx="3886200" cy="1146156"/>
+            <a:ext cx="3886200" cy="1676400"/>
           </a:xfrm>
         </p:spPr>
         <p:txBody>
-          <a:bodyPr/>
+          <a:bodyPr>
+            <a:normAutofit/>
+          </a:bodyPr>
           <a:lstStyle/>
           <a:p>
             <a:pPr marL="0" indent="0">
@@ -11685,7 +11804,11 @@
             </a:pPr>
             <a:r>
               <a:rPr lang="en-US" dirty="0" smtClean="0"/>
-              <a:t>5900 </a:t>
+              <a:t>18</a:t>
+            </a:r>
+            <a:r>
+              <a:rPr lang="en-US" dirty="0" smtClean="0"/>
+              <a:t>00 </a:t>
             </a:r>
             <a:r>
               <a:rPr lang="en-US" dirty="0" err="1" smtClean="0"/>
@@ -11693,7 +11816,15 @@
             </a:r>
             <a:r>
               <a:rPr lang="en-US" dirty="0" smtClean="0"/>
-              <a:t> firmware in C</a:t>
+              <a:t> </a:t>
+            </a:r>
+            <a:r>
+              <a:rPr lang="en-US" dirty="0" smtClean="0"/>
+              <a:t>navigation in </a:t>
+            </a:r>
+            <a:r>
+              <a:rPr lang="en-US" dirty="0" smtClean="0"/>
+              <a:t>C</a:t>
             </a:r>
           </a:p>
           <a:p>
@@ -11707,6 +11838,16 @@
             <a:r>
               <a:rPr lang="en-US" dirty="0" err="1" smtClean="0"/>
               <a:t>FreeRTOS</a:t>
+            </a:r>
+            <a:endParaRPr lang="en-US" dirty="0" smtClean="0"/>
+          </a:p>
+          <a:p>
+            <a:pPr marL="0" indent="0">
+              <a:buNone/>
+            </a:pPr>
+            <a:r>
+              <a:rPr lang="en-US" dirty="0" smtClean="0"/>
+              <a:t>+ …</a:t>
             </a:r>
             <a:endParaRPr lang="en-US" dirty="0"/>
           </a:p>
@@ -11761,7 +11902,7 @@
         <p:spPr>
           <a:xfrm>
             <a:off x="5410200" y="3314700"/>
-            <a:ext cx="3886200" cy="1828800"/>
+            <a:ext cx="3886200" cy="2209800"/>
           </a:xfrm>
           <a:prstGeom prst="rect">
             <a:avLst/>
@@ -11937,7 +12078,19 @@
             </a:pPr>
             <a:r>
               <a:rPr lang="en-US" dirty="0" smtClean="0"/>
-              <a:t>firmware in SPARK</a:t>
+              <a:t>2100 </a:t>
+            </a:r>
+            <a:r>
+              <a:rPr lang="en-US" dirty="0" err="1" smtClean="0"/>
+              <a:t>sloc</a:t>
+            </a:r>
+            <a:r>
+              <a:rPr lang="en-US" dirty="0" smtClean="0"/>
+              <a:t> navigation in </a:t>
+            </a:r>
+            <a:r>
+              <a:rPr lang="en-US" dirty="0" smtClean="0"/>
+              <a:t>SPARK</a:t>
             </a:r>
           </a:p>
           <a:p>
@@ -11966,6 +12119,17 @@
             <a:r>
               <a:rPr lang="en-US" dirty="0" err="1" smtClean="0"/>
               <a:t>FreeRTOS</a:t>
+            </a:r>
+            <a:endParaRPr lang="en-US" dirty="0" smtClean="0"/>
+          </a:p>
+          <a:p>
+            <a:pPr marL="0" indent="0">
+              <a:buFont typeface="Arial" pitchFamily="34" charset="0"/>
+              <a:buNone/>
+            </a:pPr>
+            <a:r>
+              <a:rPr lang="en-US" dirty="0" smtClean="0"/>
+              <a:t>+ …</a:t>
             </a:r>
             <a:endParaRPr lang="en-US" dirty="0" smtClean="0"/>
           </a:p>
@@ -12255,79 +12419,6 @@
       </p:pic>
       <p:sp>
         <p:nvSpPr>
-          <p:cNvPr id="14" name="Content Placeholder 2"/>
-          <p:cNvSpPr>
-            <a:spLocks noGrp="1"/>
-          </p:cNvSpPr>
-          <p:nvPr>
-            <p:ph idx="1"/>
-          </p:nvPr>
-        </p:nvSpPr>
-        <p:spPr>
-          <a:xfrm>
-            <a:off x="457200" y="3314700"/>
-            <a:ext cx="3886200" cy="1146156"/>
-          </a:xfrm>
-        </p:spPr>
-        <p:txBody>
-          <a:bodyPr/>
-          <a:lstStyle/>
-          <a:p>
-            <a:pPr marL="0" indent="0">
-              <a:buNone/>
-            </a:pPr>
-            <a:r>
-              <a:rPr lang="en-US" b="1" dirty="0" err="1" smtClean="0">
-                <a:solidFill>
-                  <a:srgbClr val="2D72AD"/>
-                </a:solidFill>
-              </a:rPr>
-              <a:t>Crazyflie</a:t>
-            </a:r>
-            <a:r>
-              <a:rPr lang="en-US" b="1" dirty="0" smtClean="0">
-                <a:solidFill>
-                  <a:srgbClr val="2D72AD"/>
-                </a:solidFill>
-              </a:rPr>
-              <a:t> 2.0</a:t>
-            </a:r>
-          </a:p>
-          <a:p>
-            <a:pPr marL="0" indent="0">
-              <a:buNone/>
-            </a:pPr>
-            <a:r>
-              <a:rPr lang="en-US" dirty="0" smtClean="0"/>
-              <a:t>5900 </a:t>
-            </a:r>
-            <a:r>
-              <a:rPr lang="en-US" dirty="0" err="1" smtClean="0"/>
-              <a:t>sloc</a:t>
-            </a:r>
-            <a:r>
-              <a:rPr lang="en-US" dirty="0" smtClean="0"/>
-              <a:t> firmware in C</a:t>
-            </a:r>
-          </a:p>
-          <a:p>
-            <a:pPr marL="0" indent="0">
-              <a:buNone/>
-            </a:pPr>
-            <a:r>
-              <a:rPr lang="en-US" dirty="0" smtClean="0"/>
-              <a:t>+ </a:t>
-            </a:r>
-            <a:r>
-              <a:rPr lang="en-US" dirty="0" err="1" smtClean="0"/>
-              <a:t>FreeRTOS</a:t>
-            </a:r>
-            <a:endParaRPr lang="en-US" dirty="0"/>
-          </a:p>
-        </p:txBody>
-      </p:sp>
-      <p:sp>
-        <p:nvSpPr>
           <p:cNvPr id="15" name="Flèche vers la droite 14"/>
           <p:cNvSpPr/>
           <p:nvPr/>
@@ -12551,7 +12642,19 @@
             </a:pPr>
             <a:r>
               <a:rPr lang="en-US" dirty="0" smtClean="0"/>
-              <a:t>firmware in SPARK</a:t>
+              <a:t>2100 </a:t>
+            </a:r>
+            <a:r>
+              <a:rPr lang="en-US" dirty="0" err="1" smtClean="0"/>
+              <a:t>sloc</a:t>
+            </a:r>
+            <a:r>
+              <a:rPr lang="en-US" dirty="0" smtClean="0"/>
+              <a:t> navigation in </a:t>
+            </a:r>
+            <a:r>
+              <a:rPr lang="en-US" dirty="0" smtClean="0"/>
+              <a:t>SPARK</a:t>
             </a:r>
           </a:p>
           <a:p>
@@ -12792,6 +12895,103 @@
               <a:t>5 months later…</a:t>
             </a:r>
             <a:endParaRPr lang="en-US" sz="4400" dirty="0"/>
+          </a:p>
+        </p:txBody>
+      </p:sp>
+      <p:sp>
+        <p:nvSpPr>
+          <p:cNvPr id="11" name="Content Placeholder 2"/>
+          <p:cNvSpPr>
+            <a:spLocks noGrp="1"/>
+          </p:cNvSpPr>
+          <p:nvPr>
+            <p:ph idx="1"/>
+          </p:nvPr>
+        </p:nvSpPr>
+        <p:spPr>
+          <a:xfrm>
+            <a:off x="457200" y="3314700"/>
+            <a:ext cx="3886200" cy="1676400"/>
+          </a:xfrm>
+        </p:spPr>
+        <p:txBody>
+          <a:bodyPr>
+            <a:normAutofit/>
+          </a:bodyPr>
+          <a:lstStyle/>
+          <a:p>
+            <a:pPr marL="0" indent="0">
+              <a:buNone/>
+            </a:pPr>
+            <a:r>
+              <a:rPr lang="en-US" b="1" dirty="0" err="1" smtClean="0">
+                <a:solidFill>
+                  <a:srgbClr val="2D72AD"/>
+                </a:solidFill>
+              </a:rPr>
+              <a:t>Crazyflie</a:t>
+            </a:r>
+            <a:r>
+              <a:rPr lang="en-US" b="1" dirty="0" smtClean="0">
+                <a:solidFill>
+                  <a:srgbClr val="2D72AD"/>
+                </a:solidFill>
+              </a:rPr>
+              <a:t> 2.0</a:t>
+            </a:r>
+          </a:p>
+          <a:p>
+            <a:pPr marL="0" indent="0">
+              <a:buNone/>
+            </a:pPr>
+            <a:r>
+              <a:rPr lang="en-US" dirty="0" smtClean="0"/>
+              <a:t>18</a:t>
+            </a:r>
+            <a:r>
+              <a:rPr lang="en-US" dirty="0" smtClean="0"/>
+              <a:t>00 </a:t>
+            </a:r>
+            <a:r>
+              <a:rPr lang="en-US" dirty="0" err="1" smtClean="0"/>
+              <a:t>sloc</a:t>
+            </a:r>
+            <a:r>
+              <a:rPr lang="en-US" dirty="0" smtClean="0"/>
+              <a:t> </a:t>
+            </a:r>
+            <a:r>
+              <a:rPr lang="en-US" dirty="0" smtClean="0"/>
+              <a:t>navigation in </a:t>
+            </a:r>
+            <a:r>
+              <a:rPr lang="en-US" dirty="0" smtClean="0"/>
+              <a:t>C</a:t>
+            </a:r>
+          </a:p>
+          <a:p>
+            <a:pPr marL="0" indent="0">
+              <a:buNone/>
+            </a:pPr>
+            <a:r>
+              <a:rPr lang="en-US" dirty="0" smtClean="0"/>
+              <a:t>+ </a:t>
+            </a:r>
+            <a:r>
+              <a:rPr lang="en-US" dirty="0" err="1" smtClean="0"/>
+              <a:t>FreeRTOS</a:t>
+            </a:r>
+            <a:endParaRPr lang="en-US" dirty="0" smtClean="0"/>
+          </a:p>
+          <a:p>
+            <a:pPr marL="0" indent="0">
+              <a:buNone/>
+            </a:pPr>
+            <a:r>
+              <a:rPr lang="en-US" dirty="0" smtClean="0"/>
+              <a:t>+ …</a:t>
+            </a:r>
+            <a:endParaRPr lang="en-US" dirty="0"/>
           </a:p>
         </p:txBody>
       </p:sp>

</xml_diff>

<commit_message>
O730-003 Update slides after dry run
</commit_message>
<xml_diff>
--- a/slides/AdaCore_Tech_Days_2015/AdaCore Tech Days SPARK 2014.pptx
+++ b/slides/AdaCore_Tech_Days_2015/AdaCore Tech Days SPARK 2014.pptx
@@ -277,7 +277,7 @@
             <a:fld id="{D83FDC75-7F73-4A4A-A77C-09AADF00E0EA}" type="datetimeFigureOut">
               <a:rPr lang="en-US" smtClean="0"/>
               <a:pPr/>
-              <a:t>04/09/15</a:t>
+              <a:t>10/09/15</a:t>
             </a:fld>
             <a:endParaRPr lang="en-US" dirty="0"/>
           </a:p>
@@ -444,7 +444,7 @@
             <a:fld id="{48AEF76B-3757-4A0B-AF93-28494465C1DD}" type="datetimeFigureOut">
               <a:rPr lang="en-US" smtClean="0"/>
               <a:pPr/>
-              <a:t>04/09/15</a:t>
+              <a:t>10/09/15</a:t>
             </a:fld>
             <a:endParaRPr lang="en-US" dirty="0"/>
           </a:p>
@@ -764,9 +764,60 @@
           </a:bodyPr>
           <a:lstStyle/>
           <a:p>
+            <a:r>
+              <a:rPr lang="en-US" baseline="0" dirty="0" smtClean="0"/>
+              <a:t>SPARK 2014 is the new version of SPARK, a subset of Ada designed for formal verification.</a:t>
+            </a:r>
+          </a:p>
+          <a:p>
+            <a:r>
+              <a:rPr lang="en-US" dirty="0" smtClean="0"/>
+              <a:t>The past two releases of the SPARK product were</a:t>
+            </a:r>
+            <a:r>
+              <a:rPr lang="en-US" baseline="0" dirty="0" smtClean="0"/>
+              <a:t> based on this new version, so many of you know a lot about what SPARK is.</a:t>
+            </a:r>
+          </a:p>
+          <a:p>
+            <a:r>
+              <a:rPr lang="en-US" baseline="0" dirty="0" smtClean="0"/>
+              <a:t>Intro SPARK + contracts  + plan (</a:t>
+            </a:r>
+            <a:r>
+              <a:rPr lang="en-US" baseline="0" dirty="0" err="1" smtClean="0"/>
+              <a:t>certif</a:t>
+            </a:r>
+            <a:r>
+              <a:rPr lang="en-US" baseline="0" dirty="0" smtClean="0"/>
+              <a:t> </a:t>
+            </a:r>
+            <a:r>
+              <a:rPr lang="en-US" baseline="0" dirty="0" err="1" smtClean="0"/>
+              <a:t>ou</a:t>
+            </a:r>
+            <a:r>
+              <a:rPr lang="en-US" baseline="0" smtClean="0"/>
+              <a:t> pas)</a:t>
+            </a:r>
+            <a:endParaRPr lang="en-US" baseline="0" dirty="0" smtClean="0"/>
+          </a:p>
+          <a:p>
+            <a:r>
+              <a:rPr lang="en-US" baseline="0" dirty="0" smtClean="0"/>
+              <a:t>This presentation is not so much about what SPARK is, but about why and how to use it. And in particular, how it can be easily adopted in an your processes, and easily used by your teams.</a:t>
+            </a:r>
             <a:endParaRPr lang="en-US" dirty="0" smtClean="0"/>
           </a:p>
           <a:p>
+            <a:r>
+              <a:rPr lang="en-US" dirty="0" smtClean="0"/>
+              <a:t>Hence this bold claim: formal</a:t>
+            </a:r>
+            <a:r>
+              <a:rPr lang="en-US" baseline="0" dirty="0" smtClean="0"/>
+              <a:t> verification IS easy with SPARK 2014.</a:t>
+            </a:r>
             <a:endParaRPr lang="en-US" dirty="0"/>
           </a:p>
         </p:txBody>
@@ -792,6 +843,158 @@
               <a:t>2</a:t>
             </a:fld>
             <a:endParaRPr lang="en-US"/>
+          </a:p>
+        </p:txBody>
+      </p:sp>
+    </p:spTree>
+  </p:cSld>
+  <p:clrMapOvr>
+    <a:masterClrMapping/>
+  </p:clrMapOvr>
+</p:notes>
+</file>
+
+<file path=ppt/notesSlides/notesSlide10.xml><?xml version="1.0" encoding="utf-8"?>
+<p:notes xmlns:a="http://schemas.openxmlformats.org/drawingml/2006/main" xmlns:r="http://schemas.openxmlformats.org/officeDocument/2006/relationships" xmlns:p="http://schemas.openxmlformats.org/presentationml/2006/main">
+  <p:cSld>
+    <p:spTree>
+      <p:nvGrpSpPr>
+        <p:cNvPr id="1" name=""/>
+        <p:cNvGrpSpPr/>
+        <p:nvPr/>
+      </p:nvGrpSpPr>
+      <p:grpSpPr>
+        <a:xfrm>
+          <a:off x="0" y="0"/>
+          <a:ext cx="0" cy="0"/>
+          <a:chOff x="0" y="0"/>
+          <a:chExt cx="0" cy="0"/>
+        </a:xfrm>
+      </p:grpSpPr>
+      <p:sp>
+        <p:nvSpPr>
+          <p:cNvPr id="40962" name="Rectangle 23"/>
+          <p:cNvSpPr>
+            <a:spLocks noGrp="1" noChangeArrowheads="1"/>
+          </p:cNvSpPr>
+          <p:nvPr>
+            <p:ph type="hdr" sz="quarter"/>
+          </p:nvPr>
+        </p:nvSpPr>
+        <p:spPr>
+          <a:noFill/>
+        </p:spPr>
+        <p:txBody>
+          <a:bodyPr/>
+          <a:lstStyle/>
+          <a:p>
+            <a:r>
+              <a:rPr lang="en-US" dirty="0" smtClean="0"/>
+              <a:t>Microsoft </a:t>
+            </a:r>
+            <a:r>
+              <a:rPr lang="en-US" b="1" dirty="0" smtClean="0"/>
+              <a:t>Engineering Excellence</a:t>
+            </a:r>
+            <a:endParaRPr lang="en-US" dirty="0" smtClean="0"/>
+          </a:p>
+        </p:txBody>
+      </p:sp>
+      <p:sp>
+        <p:nvSpPr>
+          <p:cNvPr id="40963" name="Rectangle 25"/>
+          <p:cNvSpPr>
+            <a:spLocks noGrp="1" noChangeArrowheads="1"/>
+          </p:cNvSpPr>
+          <p:nvPr>
+            <p:ph type="ftr" sz="quarter" idx="4"/>
+          </p:nvPr>
+        </p:nvSpPr>
+        <p:spPr>
+          <a:noFill/>
+        </p:spPr>
+        <p:txBody>
+          <a:bodyPr/>
+          <a:lstStyle/>
+          <a:p>
+            <a:r>
+              <a:rPr lang="en-US" dirty="0" smtClean="0"/>
+              <a:t>Microsoft Confidential</a:t>
+            </a:r>
+          </a:p>
+        </p:txBody>
+      </p:sp>
+      <p:sp>
+        <p:nvSpPr>
+          <p:cNvPr id="40964" name="Rectangle 26"/>
+          <p:cNvSpPr>
+            <a:spLocks noGrp="1" noChangeArrowheads="1"/>
+          </p:cNvSpPr>
+          <p:nvPr>
+            <p:ph type="sldNum" sz="quarter" idx="5"/>
+          </p:nvPr>
+        </p:nvSpPr>
+        <p:spPr>
+          <a:noFill/>
+        </p:spPr>
+        <p:txBody>
+          <a:bodyPr/>
+          <a:lstStyle/>
+          <a:p>
+            <a:fld id="{85CEDE57-F8FE-4B43-B511-2E9F76624F74}" type="slidenum">
+              <a:rPr lang="en-US" smtClean="0"/>
+              <a:pPr/>
+              <a:t>26</a:t>
+            </a:fld>
+            <a:endParaRPr lang="en-US" dirty="0" smtClean="0"/>
+          </a:p>
+        </p:txBody>
+      </p:sp>
+      <p:sp>
+        <p:nvSpPr>
+          <p:cNvPr id="40965" name="Rectangle 2"/>
+          <p:cNvSpPr>
+            <a:spLocks noGrp="1" noRot="1" noChangeAspect="1" noChangeArrowheads="1" noTextEdit="1"/>
+          </p:cNvSpPr>
+          <p:nvPr>
+            <p:ph type="sldImg"/>
+          </p:nvPr>
+        </p:nvSpPr>
+        <p:spPr>
+          <a:xfrm>
+            <a:off x="701675" y="449263"/>
+            <a:ext cx="5453063" cy="3408362"/>
+          </a:xfrm>
+          <a:ln/>
+        </p:spPr>
+      </p:sp>
+      <p:sp>
+        <p:nvSpPr>
+          <p:cNvPr id="40966" name="Rectangle 3"/>
+          <p:cNvSpPr>
+            <a:spLocks noGrp="1" noChangeArrowheads="1"/>
+          </p:cNvSpPr>
+          <p:nvPr>
+            <p:ph type="body" idx="1"/>
+          </p:nvPr>
+        </p:nvSpPr>
+        <p:spPr>
+          <a:xfrm>
+            <a:off x="307492" y="4139472"/>
+            <a:ext cx="6261652" cy="4593861"/>
+          </a:xfrm>
+          <a:noFill/>
+          <a:ln/>
+        </p:spPr>
+        <p:txBody>
+          <a:bodyPr/>
+          <a:lstStyle/>
+          <a:p>
+            <a:pPr>
+              <a:buFontTx/>
+              <a:buNone/>
+            </a:pPr>
+            <a:endParaRPr lang="en-US" dirty="0" smtClean="0"/>
           </a:p>
         </p:txBody>
       </p:sp>
@@ -846,6 +1049,126 @@
         <p:txBody>
           <a:bodyPr/>
           <a:lstStyle/>
+          <a:p>
+            <a:r>
+              <a:rPr lang="fr-FR" dirty="0" smtClean="0"/>
+              <a:t>Start</a:t>
+            </a:r>
+            <a:r>
+              <a:rPr lang="fr-FR" baseline="0" dirty="0" smtClean="0"/>
+              <a:t> </a:t>
+            </a:r>
+            <a:r>
+              <a:rPr lang="fr-FR" baseline="0" dirty="0" err="1" smtClean="0"/>
+              <a:t>with</a:t>
+            </a:r>
+            <a:r>
+              <a:rPr lang="fr-FR" baseline="0" dirty="0" smtClean="0"/>
+              <a:t> story </a:t>
+            </a:r>
+            <a:r>
+              <a:rPr lang="fr-FR" baseline="0" dirty="0" err="1" smtClean="0"/>
+              <a:t>that</a:t>
+            </a:r>
+            <a:r>
+              <a:rPr lang="fr-FR" baseline="0" dirty="0" smtClean="0"/>
+              <a:t> supports </a:t>
+            </a:r>
+            <a:r>
+              <a:rPr lang="fr-FR" baseline="0" dirty="0" err="1" smtClean="0"/>
+              <a:t>my</a:t>
+            </a:r>
+            <a:r>
+              <a:rPr lang="fr-FR" baseline="0" dirty="0" smtClean="0"/>
+              <a:t> </a:t>
+            </a:r>
+            <a:r>
+              <a:rPr lang="fr-FR" baseline="0" dirty="0" err="1" smtClean="0"/>
+              <a:t>bold</a:t>
+            </a:r>
+            <a:r>
+              <a:rPr lang="fr-FR" baseline="0" dirty="0" smtClean="0"/>
+              <a:t> claim.</a:t>
+            </a:r>
+          </a:p>
+          <a:p>
+            <a:r>
+              <a:rPr lang="fr-FR" baseline="0" dirty="0" smtClean="0"/>
+              <a:t>This </a:t>
+            </a:r>
+            <a:r>
+              <a:rPr lang="fr-FR" baseline="0" dirty="0" err="1" smtClean="0"/>
+              <a:t>is</a:t>
+            </a:r>
+            <a:r>
+              <a:rPr lang="fr-FR" baseline="0" dirty="0" smtClean="0"/>
+              <a:t> the </a:t>
+            </a:r>
+            <a:r>
+              <a:rPr lang="fr-FR" baseline="0" dirty="0" err="1" smtClean="0"/>
+              <a:t>Crazyflie</a:t>
+            </a:r>
+            <a:r>
+              <a:rPr lang="fr-FR" baseline="0" dirty="0" smtClean="0"/>
+              <a:t>, a </a:t>
+            </a:r>
+            <a:r>
+              <a:rPr lang="fr-FR" baseline="0" dirty="0" err="1" smtClean="0"/>
+              <a:t>small</a:t>
+            </a:r>
+            <a:r>
+              <a:rPr lang="fr-FR" baseline="0" dirty="0" smtClean="0"/>
+              <a:t> </a:t>
+            </a:r>
+            <a:r>
+              <a:rPr lang="fr-FR" baseline="0" dirty="0" err="1" smtClean="0"/>
+              <a:t>leisure</a:t>
+            </a:r>
+            <a:r>
+              <a:rPr lang="fr-FR" baseline="0" dirty="0" smtClean="0"/>
+              <a:t> drone, </a:t>
+            </a:r>
+            <a:r>
+              <a:rPr lang="fr-FR" baseline="0" dirty="0" err="1" smtClean="0"/>
+              <a:t>originally</a:t>
+            </a:r>
+            <a:r>
+              <a:rPr lang="fr-FR" baseline="0" dirty="0" smtClean="0"/>
+              <a:t> </a:t>
+            </a:r>
+            <a:r>
+              <a:rPr lang="fr-FR" baseline="0" dirty="0" err="1" smtClean="0"/>
+              <a:t>programmed</a:t>
+            </a:r>
+            <a:r>
+              <a:rPr lang="fr-FR" baseline="0" dirty="0" smtClean="0"/>
+              <a:t> in C on top of </a:t>
+            </a:r>
+            <a:r>
+              <a:rPr lang="fr-FR" baseline="0" dirty="0" err="1" smtClean="0"/>
+              <a:t>FreeRTOS</a:t>
+            </a:r>
+            <a:r>
+              <a:rPr lang="fr-FR" baseline="0" dirty="0" smtClean="0"/>
+              <a:t> + </a:t>
+            </a:r>
+            <a:r>
+              <a:rPr lang="fr-FR" baseline="0" dirty="0" err="1" smtClean="0"/>
+              <a:t>libraries</a:t>
+            </a:r>
+            <a:r>
+              <a:rPr lang="fr-FR" baseline="0" dirty="0" smtClean="0"/>
+              <a:t>/drivers/</a:t>
+            </a:r>
+            <a:r>
+              <a:rPr lang="fr-FR" baseline="0" dirty="0" err="1" smtClean="0"/>
+              <a:t>etc</a:t>
+            </a:r>
+            <a:r>
+              <a:rPr lang="fr-FR" baseline="0" dirty="0" smtClean="0"/>
+              <a:t> all in C.</a:t>
+            </a:r>
+          </a:p>
           <a:p>
             <a:endParaRPr lang="fr-FR" dirty="0"/>
           </a:p>
@@ -907,7 +1230,7 @@
       </p:grpSpPr>
       <p:sp>
         <p:nvSpPr>
-          <p:cNvPr id="2" name="Slide Image Placeholder 1"/>
+          <p:cNvPr id="2" name="Espace réservé de l'image des diapositives 1"/>
           <p:cNvSpPr>
             <a:spLocks noGrp="1" noRot="1" noChangeAspect="1"/>
           </p:cNvSpPr>
@@ -915,16 +1238,11 @@
             <p:ph type="sldImg"/>
           </p:nvPr>
         </p:nvSpPr>
-        <p:spPr>
-          <a:xfrm>
-            <a:off x="685800" y="685800"/>
-            <a:ext cx="5486400" cy="3429000"/>
-          </a:xfrm>
-        </p:spPr>
-      </p:sp>
-      <p:sp>
-        <p:nvSpPr>
-          <p:cNvPr id="3" name="Notes Placeholder 2"/>
+        <p:spPr/>
+      </p:sp>
+      <p:sp>
+        <p:nvSpPr>
+          <p:cNvPr id="3" name="Espace réservé des commentaires 2"/>
           <p:cNvSpPr>
             <a:spLocks noGrp="1"/>
           </p:cNvSpPr>
@@ -934,32 +1252,278 @@
         </p:nvSpPr>
         <p:spPr/>
         <p:txBody>
-          <a:bodyPr>
-            <a:normAutofit/>
-          </a:bodyPr>
+          <a:bodyPr/>
           <a:lstStyle/>
           <a:p>
             <a:r>
-              <a:rPr lang="en-US" dirty="0" smtClean="0"/>
-              <a:t>Summarize presentation content by restating the important points from the lessons.</a:t>
-            </a:r>
-          </a:p>
-          <a:p>
-            <a:r>
-              <a:rPr lang="en-US" dirty="0" smtClean="0"/>
-              <a:t>What do you want the audience to remember when they leave your </a:t>
-            </a:r>
-            <a:r>
-              <a:rPr lang="en-US" smtClean="0"/>
-              <a:t>presentation?</a:t>
-            </a:r>
-            <a:endParaRPr lang="en-US" dirty="0" smtClean="0"/>
-          </a:p>
-        </p:txBody>
-      </p:sp>
-      <p:sp>
-        <p:nvSpPr>
-          <p:cNvPr id="4" name="Slide Number Placeholder 3"/>
+              <a:rPr lang="fr-FR" dirty="0" smtClean="0"/>
+              <a:t>This </a:t>
+            </a:r>
+            <a:r>
+              <a:rPr lang="fr-FR" dirty="0" err="1" smtClean="0"/>
+              <a:t>is</a:t>
+            </a:r>
+            <a:r>
+              <a:rPr lang="fr-FR" dirty="0" smtClean="0"/>
+              <a:t> </a:t>
+            </a:r>
+            <a:r>
+              <a:rPr lang="fr-FR" dirty="0" err="1" smtClean="0"/>
+              <a:t>our</a:t>
+            </a:r>
+            <a:r>
+              <a:rPr lang="fr-FR" dirty="0" smtClean="0"/>
+              <a:t> </a:t>
+            </a:r>
+            <a:r>
+              <a:rPr lang="fr-FR" dirty="0" err="1" smtClean="0"/>
+              <a:t>intern</a:t>
+            </a:r>
+            <a:r>
+              <a:rPr lang="fr-FR" dirty="0" smtClean="0"/>
+              <a:t> Anthony Leonardo </a:t>
+            </a:r>
+            <a:r>
+              <a:rPr lang="fr-FR" dirty="0" err="1" smtClean="0"/>
+              <a:t>Gracio</a:t>
+            </a:r>
+            <a:r>
+              <a:rPr lang="fr-FR" dirty="0" smtClean="0"/>
+              <a:t>.</a:t>
+            </a:r>
+          </a:p>
+          <a:p>
+            <a:r>
+              <a:rPr lang="fr-FR" dirty="0" smtClean="0"/>
+              <a:t>Anthony </a:t>
+            </a:r>
+            <a:r>
+              <a:rPr lang="fr-FR" dirty="0" err="1" smtClean="0"/>
+              <a:t>had</a:t>
+            </a:r>
+            <a:r>
+              <a:rPr lang="fr-FR" dirty="0" smtClean="0"/>
+              <a:t> </a:t>
+            </a:r>
+            <a:r>
+              <a:rPr lang="fr-FR" dirty="0" err="1" smtClean="0"/>
+              <a:t>little</a:t>
+            </a:r>
+            <a:r>
+              <a:rPr lang="fr-FR" dirty="0" smtClean="0"/>
+              <a:t> </a:t>
+            </a:r>
+            <a:r>
+              <a:rPr lang="fr-FR" dirty="0" err="1" smtClean="0"/>
+              <a:t>knowledge</a:t>
+            </a:r>
+            <a:r>
+              <a:rPr lang="fr-FR" dirty="0" smtClean="0"/>
+              <a:t> of Ada and no </a:t>
+            </a:r>
+            <a:r>
+              <a:rPr lang="fr-FR" dirty="0" err="1" smtClean="0"/>
+              <a:t>knowledge</a:t>
+            </a:r>
+            <a:r>
+              <a:rPr lang="fr-FR" dirty="0" smtClean="0"/>
+              <a:t> of SPARK or</a:t>
+            </a:r>
+            <a:r>
+              <a:rPr lang="fr-FR" baseline="0" dirty="0" smtClean="0"/>
+              <a:t> of </a:t>
+            </a:r>
+            <a:r>
+              <a:rPr lang="fr-FR" baseline="0" dirty="0" err="1" smtClean="0"/>
+              <a:t>any</a:t>
+            </a:r>
+            <a:r>
+              <a:rPr lang="fr-FR" baseline="0" dirty="0" smtClean="0"/>
+              <a:t> </a:t>
+            </a:r>
+            <a:r>
+              <a:rPr lang="fr-FR" baseline="0" dirty="0" err="1" smtClean="0"/>
+              <a:t>static</a:t>
+            </a:r>
+            <a:r>
+              <a:rPr lang="fr-FR" baseline="0" dirty="0" smtClean="0"/>
+              <a:t> </a:t>
+            </a:r>
+            <a:r>
+              <a:rPr lang="fr-FR" baseline="0" dirty="0" err="1" smtClean="0"/>
+              <a:t>analysis</a:t>
+            </a:r>
+            <a:r>
+              <a:rPr lang="fr-FR" baseline="0" dirty="0" smtClean="0"/>
+              <a:t> </a:t>
+            </a:r>
+            <a:r>
+              <a:rPr lang="fr-FR" baseline="0" dirty="0" err="1" smtClean="0"/>
+              <a:t>tools</a:t>
+            </a:r>
+            <a:r>
+              <a:rPr lang="fr-FR" baseline="0" dirty="0" smtClean="0"/>
+              <a:t> </a:t>
+            </a:r>
+            <a:r>
+              <a:rPr lang="fr-FR" baseline="0" dirty="0" err="1" smtClean="0"/>
+              <a:t>prior</a:t>
+            </a:r>
+            <a:r>
+              <a:rPr lang="fr-FR" baseline="0" dirty="0" smtClean="0"/>
+              <a:t> to </a:t>
+            </a:r>
+            <a:r>
+              <a:rPr lang="fr-FR" baseline="0" dirty="0" err="1" smtClean="0"/>
+              <a:t>his</a:t>
+            </a:r>
+            <a:r>
+              <a:rPr lang="fr-FR" baseline="0" dirty="0" smtClean="0"/>
+              <a:t> </a:t>
+            </a:r>
+            <a:r>
+              <a:rPr lang="fr-FR" baseline="0" dirty="0" err="1" smtClean="0"/>
+              <a:t>internship</a:t>
+            </a:r>
+            <a:r>
+              <a:rPr lang="fr-FR" baseline="0" dirty="0" smtClean="0"/>
+              <a:t>.</a:t>
+            </a:r>
+          </a:p>
+          <a:p>
+            <a:r>
+              <a:rPr lang="fr-FR" baseline="0" dirty="0" err="1" smtClean="0"/>
+              <a:t>Yet</a:t>
+            </a:r>
+            <a:r>
+              <a:rPr lang="fr-FR" baseline="0" dirty="0" smtClean="0"/>
+              <a:t>, in 2 </a:t>
+            </a:r>
+            <a:r>
+              <a:rPr lang="fr-FR" baseline="0" dirty="0" err="1" smtClean="0"/>
+              <a:t>months</a:t>
+            </a:r>
+            <a:r>
+              <a:rPr lang="fr-FR" baseline="0" dirty="0" smtClean="0"/>
+              <a:t>, Anthony </a:t>
+            </a:r>
+            <a:r>
+              <a:rPr lang="fr-FR" baseline="0" dirty="0" err="1" smtClean="0"/>
+              <a:t>rewrote</a:t>
+            </a:r>
+            <a:r>
+              <a:rPr lang="fr-FR" baseline="0" dirty="0" smtClean="0"/>
+              <a:t> </a:t>
+            </a:r>
+            <a:r>
+              <a:rPr lang="fr-FR" baseline="0" dirty="0" err="1" smtClean="0"/>
+              <a:t>completely</a:t>
+            </a:r>
+            <a:r>
+              <a:rPr lang="fr-FR" baseline="0" dirty="0" smtClean="0"/>
+              <a:t> the </a:t>
+            </a:r>
+            <a:r>
+              <a:rPr lang="fr-FR" baseline="0" dirty="0" err="1" smtClean="0"/>
+              <a:t>stabilization</a:t>
+            </a:r>
+            <a:r>
+              <a:rPr lang="fr-FR" baseline="0" dirty="0" smtClean="0"/>
+              <a:t> code of the </a:t>
+            </a:r>
+            <a:r>
+              <a:rPr lang="fr-FR" baseline="0" dirty="0" err="1" smtClean="0"/>
+              <a:t>Crazyflie</a:t>
+            </a:r>
+            <a:r>
+              <a:rPr lang="fr-FR" baseline="0" dirty="0" smtClean="0"/>
+              <a:t> in SPARK, and </a:t>
+            </a:r>
+            <a:r>
+              <a:rPr lang="fr-FR" baseline="0" dirty="0" err="1" smtClean="0"/>
+              <a:t>he</a:t>
+            </a:r>
+            <a:r>
+              <a:rPr lang="fr-FR" baseline="0" dirty="0" smtClean="0"/>
+              <a:t> </a:t>
+            </a:r>
+            <a:r>
+              <a:rPr lang="fr-FR" baseline="0" dirty="0" err="1" smtClean="0"/>
+              <a:t>proved</a:t>
+            </a:r>
+            <a:r>
+              <a:rPr lang="fr-FR" baseline="0" dirty="0" smtClean="0"/>
+              <a:t> absence of </a:t>
+            </a:r>
+            <a:r>
+              <a:rPr lang="fr-FR" baseline="0" dirty="0" err="1" smtClean="0"/>
+              <a:t>run</a:t>
+            </a:r>
+            <a:r>
+              <a:rPr lang="fr-FR" baseline="0" dirty="0" smtClean="0"/>
+              <a:t>-time </a:t>
+            </a:r>
+            <a:r>
+              <a:rPr lang="fr-FR" baseline="0" dirty="0" err="1" smtClean="0"/>
+              <a:t>errors</a:t>
+            </a:r>
+            <a:r>
+              <a:rPr lang="fr-FR" baseline="0" dirty="0" smtClean="0"/>
+              <a:t> on the SPARK code.</a:t>
+            </a:r>
+          </a:p>
+          <a:p>
+            <a:r>
+              <a:rPr lang="fr-FR" baseline="0" dirty="0" smtClean="0"/>
+              <a:t>And the drone </a:t>
+            </a:r>
+            <a:r>
+              <a:rPr lang="fr-FR" baseline="0" dirty="0" err="1" smtClean="0"/>
+              <a:t>was</a:t>
+            </a:r>
+            <a:r>
+              <a:rPr lang="fr-FR" baseline="0" dirty="0" smtClean="0"/>
+              <a:t> </a:t>
+            </a:r>
+            <a:r>
+              <a:rPr lang="fr-FR" baseline="0" dirty="0" err="1" smtClean="0"/>
+              <a:t>flying</a:t>
+            </a:r>
+            <a:r>
+              <a:rPr lang="fr-FR" baseline="0" dirty="0" smtClean="0"/>
+              <a:t> </a:t>
+            </a:r>
+            <a:r>
+              <a:rPr lang="fr-FR" baseline="0" dirty="0" err="1" smtClean="0"/>
+              <a:t>better</a:t>
+            </a:r>
+            <a:r>
+              <a:rPr lang="fr-FR" baseline="0" dirty="0" smtClean="0"/>
+              <a:t> </a:t>
+            </a:r>
+            <a:r>
+              <a:rPr lang="fr-FR" baseline="0" dirty="0" err="1" smtClean="0"/>
+              <a:t>at</a:t>
+            </a:r>
+            <a:r>
+              <a:rPr lang="fr-FR" baseline="0" dirty="0" smtClean="0"/>
+              <a:t> </a:t>
+            </a:r>
+            <a:r>
+              <a:rPr lang="fr-FR" baseline="0" dirty="0" err="1" smtClean="0"/>
+              <a:t>this</a:t>
+            </a:r>
+            <a:r>
+              <a:rPr lang="fr-FR" baseline="0" dirty="0" smtClean="0"/>
+              <a:t> stage.</a:t>
+            </a:r>
+            <a:endParaRPr lang="fr-FR" dirty="0"/>
+          </a:p>
+        </p:txBody>
+      </p:sp>
+      <p:sp>
+        <p:nvSpPr>
+          <p:cNvPr id="4" name="Espace réservé du numéro de diapositive 3"/>
           <p:cNvSpPr>
             <a:spLocks noGrp="1"/>
           </p:cNvSpPr>
@@ -972,16 +1536,21 @@
           <a:bodyPr/>
           <a:lstStyle/>
           <a:p>
-            <a:fld id="{EC6EAC7D-5A89-47C2-8ABA-56C9C2DEF7A4}" type="slidenum">
+            <a:fld id="{75693FD4-8F83-4EF7-AC3F-0DC0388986B0}" type="slidenum">
               <a:rPr lang="en-US" smtClean="0"/>
               <a:pPr/>
-              <a:t>25</a:t>
+              <a:t>4</a:t>
             </a:fld>
             <a:endParaRPr lang="en-US" dirty="0"/>
           </a:p>
         </p:txBody>
       </p:sp>
     </p:spTree>
+    <p:extLst>
+      <p:ext uri="{BB962C8B-B14F-4D97-AF65-F5344CB8AC3E}">
+        <p14:creationId xmlns:p14="http://schemas.microsoft.com/office/powerpoint/2010/main" val="1876144363"/>
+      </p:ext>
+    </p:extLst>
   </p:cSld>
   <p:clrMapOvr>
     <a:masterClrMapping/>
@@ -1008,128 +1577,1012 @@
       </p:grpSpPr>
       <p:sp>
         <p:nvSpPr>
-          <p:cNvPr id="40962" name="Rectangle 23"/>
+          <p:cNvPr id="2" name="Espace réservé de l'image des diapositives 1"/>
           <p:cNvSpPr>
-            <a:spLocks noGrp="1" noChangeArrowheads="1"/>
-          </p:cNvSpPr>
-          <p:nvPr>
-            <p:ph type="hdr" sz="quarter"/>
-          </p:nvPr>
-        </p:nvSpPr>
-        <p:spPr>
-          <a:noFill/>
-        </p:spPr>
-        <p:txBody>
-          <a:bodyPr/>
-          <a:lstStyle/>
-          <a:p>
-            <a:r>
-              <a:rPr lang="en-US" dirty="0" smtClean="0"/>
-              <a:t>Microsoft </a:t>
-            </a:r>
-            <a:r>
-              <a:rPr lang="en-US" b="1" dirty="0" smtClean="0"/>
-              <a:t>Engineering Excellence</a:t>
-            </a:r>
-            <a:endParaRPr lang="en-US" dirty="0" smtClean="0"/>
-          </a:p>
-        </p:txBody>
-      </p:sp>
-      <p:sp>
-        <p:nvSpPr>
-          <p:cNvPr id="40963" name="Rectangle 25"/>
-          <p:cNvSpPr>
-            <a:spLocks noGrp="1" noChangeArrowheads="1"/>
-          </p:cNvSpPr>
-          <p:nvPr>
-            <p:ph type="ftr" sz="quarter" idx="4"/>
-          </p:nvPr>
-        </p:nvSpPr>
-        <p:spPr>
-          <a:noFill/>
-        </p:spPr>
-        <p:txBody>
-          <a:bodyPr/>
-          <a:lstStyle/>
-          <a:p>
-            <a:r>
-              <a:rPr lang="en-US" dirty="0" smtClean="0"/>
-              <a:t>Microsoft Confidential</a:t>
-            </a:r>
-          </a:p>
-        </p:txBody>
-      </p:sp>
-      <p:sp>
-        <p:nvSpPr>
-          <p:cNvPr id="40964" name="Rectangle 26"/>
-          <p:cNvSpPr>
-            <a:spLocks noGrp="1" noChangeArrowheads="1"/>
-          </p:cNvSpPr>
-          <p:nvPr>
-            <p:ph type="sldNum" sz="quarter" idx="5"/>
-          </p:nvPr>
-        </p:nvSpPr>
-        <p:spPr>
-          <a:noFill/>
-        </p:spPr>
-        <p:txBody>
-          <a:bodyPr/>
-          <a:lstStyle/>
-          <a:p>
-            <a:fld id="{85CEDE57-F8FE-4B43-B511-2E9F76624F74}" type="slidenum">
-              <a:rPr lang="en-US" smtClean="0"/>
-              <a:pPr/>
-              <a:t>26</a:t>
-            </a:fld>
-            <a:endParaRPr lang="en-US" dirty="0" smtClean="0"/>
-          </a:p>
-        </p:txBody>
-      </p:sp>
-      <p:sp>
-        <p:nvSpPr>
-          <p:cNvPr id="40965" name="Rectangle 2"/>
-          <p:cNvSpPr>
-            <a:spLocks noGrp="1" noRot="1" noChangeAspect="1" noChangeArrowheads="1" noTextEdit="1"/>
+            <a:spLocks noGrp="1" noRot="1" noChangeAspect="1"/>
           </p:cNvSpPr>
           <p:nvPr>
             <p:ph type="sldImg"/>
           </p:nvPr>
         </p:nvSpPr>
-        <p:spPr>
-          <a:xfrm>
-            <a:off x="701675" y="449263"/>
-            <a:ext cx="5453063" cy="3408362"/>
-          </a:xfrm>
-          <a:ln/>
-        </p:spPr>
-      </p:sp>
-      <p:sp>
-        <p:nvSpPr>
-          <p:cNvPr id="40966" name="Rectangle 3"/>
+        <p:spPr/>
+      </p:sp>
+      <p:sp>
+        <p:nvSpPr>
+          <p:cNvPr id="3" name="Espace réservé des commentaires 2"/>
           <p:cNvSpPr>
-            <a:spLocks noGrp="1" noChangeArrowheads="1"/>
+            <a:spLocks noGrp="1"/>
           </p:cNvSpPr>
           <p:nvPr>
             <p:ph type="body" idx="1"/>
           </p:nvPr>
         </p:nvSpPr>
+        <p:spPr/>
+        <p:txBody>
+          <a:bodyPr/>
+          <a:lstStyle/>
+          <a:p>
+            <a:r>
+              <a:rPr lang="fr-FR" dirty="0" smtClean="0"/>
+              <a:t>Just </a:t>
+            </a:r>
+            <a:r>
+              <a:rPr lang="fr-FR" dirty="0" err="1" smtClean="0"/>
+              <a:t>give</a:t>
+            </a:r>
+            <a:r>
+              <a:rPr lang="fr-FR" dirty="0" smtClean="0"/>
+              <a:t> </a:t>
+            </a:r>
+            <a:r>
+              <a:rPr lang="fr-FR" dirty="0" err="1" smtClean="0"/>
+              <a:t>him</a:t>
+            </a:r>
+            <a:r>
+              <a:rPr lang="fr-FR" dirty="0" smtClean="0"/>
+              <a:t> 3 more </a:t>
+            </a:r>
+            <a:r>
+              <a:rPr lang="fr-FR" dirty="0" err="1" smtClean="0"/>
+              <a:t>months</a:t>
+            </a:r>
+            <a:r>
+              <a:rPr lang="fr-FR" dirty="0" smtClean="0"/>
+              <a:t>, and </a:t>
+            </a:r>
+            <a:r>
+              <a:rPr lang="fr-FR" dirty="0" err="1" smtClean="0"/>
+              <a:t>he</a:t>
+            </a:r>
+            <a:r>
+              <a:rPr lang="fr-FR" dirty="0" smtClean="0"/>
+              <a:t> </a:t>
+            </a:r>
+            <a:r>
+              <a:rPr lang="fr-FR" dirty="0" err="1" smtClean="0"/>
+              <a:t>rewrote</a:t>
+            </a:r>
+            <a:r>
+              <a:rPr lang="fr-FR" dirty="0" smtClean="0"/>
+              <a:t> the </a:t>
+            </a:r>
+            <a:r>
+              <a:rPr lang="fr-FR" dirty="0" err="1" smtClean="0"/>
+              <a:t>complete</a:t>
+            </a:r>
+            <a:r>
+              <a:rPr lang="fr-FR" dirty="0" smtClean="0"/>
+              <a:t> </a:t>
+            </a:r>
+            <a:r>
+              <a:rPr lang="fr-FR" dirty="0" err="1" smtClean="0"/>
+              <a:t>firmware</a:t>
+            </a:r>
+            <a:r>
+              <a:rPr lang="fr-FR" baseline="0" dirty="0" smtClean="0"/>
+              <a:t> in SPARK and Ada.</a:t>
+            </a:r>
+          </a:p>
+          <a:p>
+            <a:r>
+              <a:rPr lang="fr-FR" baseline="0" dirty="0" smtClean="0"/>
+              <a:t>And </a:t>
+            </a:r>
+            <a:r>
+              <a:rPr lang="fr-FR" baseline="0" dirty="0" err="1" smtClean="0"/>
+              <a:t>now</a:t>
+            </a:r>
+            <a:r>
+              <a:rPr lang="fr-FR" baseline="0" dirty="0" smtClean="0"/>
+              <a:t> </a:t>
+            </a:r>
+            <a:r>
+              <a:rPr lang="fr-FR" baseline="0" dirty="0" err="1" smtClean="0"/>
+              <a:t>we</a:t>
+            </a:r>
+            <a:r>
+              <a:rPr lang="fr-FR" baseline="0" dirty="0" smtClean="0"/>
+              <a:t> </a:t>
+            </a:r>
+            <a:r>
+              <a:rPr lang="fr-FR" baseline="0" dirty="0" err="1" smtClean="0"/>
+              <a:t>expect</a:t>
+            </a:r>
+            <a:r>
+              <a:rPr lang="fr-FR" baseline="0" dirty="0" smtClean="0"/>
+              <a:t> to </a:t>
+            </a:r>
+            <a:r>
+              <a:rPr lang="fr-FR" baseline="0" dirty="0" err="1" smtClean="0"/>
+              <a:t>prove</a:t>
+            </a:r>
+            <a:r>
+              <a:rPr lang="fr-FR" baseline="0" dirty="0" smtClean="0"/>
+              <a:t> absence of </a:t>
+            </a:r>
+            <a:r>
+              <a:rPr lang="fr-FR" baseline="0" dirty="0" err="1" smtClean="0"/>
+              <a:t>concurrency</a:t>
+            </a:r>
+            <a:r>
+              <a:rPr lang="fr-FR" baseline="0" dirty="0" smtClean="0"/>
+              <a:t> </a:t>
+            </a:r>
+            <a:r>
+              <a:rPr lang="fr-FR" baseline="0" dirty="0" err="1" smtClean="0"/>
+              <a:t>errors</a:t>
+            </a:r>
+            <a:r>
+              <a:rPr lang="fr-FR" baseline="0" dirty="0" smtClean="0"/>
+              <a:t> </a:t>
+            </a:r>
+            <a:r>
+              <a:rPr lang="fr-FR" baseline="0" dirty="0" err="1" smtClean="0"/>
+              <a:t>with</a:t>
+            </a:r>
+            <a:r>
+              <a:rPr lang="fr-FR" baseline="0" dirty="0" smtClean="0"/>
+              <a:t> the </a:t>
+            </a:r>
+            <a:r>
+              <a:rPr lang="fr-FR" baseline="0" dirty="0" err="1" smtClean="0"/>
+              <a:t>upcoming</a:t>
+            </a:r>
+            <a:r>
+              <a:rPr lang="fr-FR" baseline="0" dirty="0" smtClean="0"/>
+              <a:t> version of SPARK </a:t>
+            </a:r>
+            <a:r>
+              <a:rPr lang="fr-FR" baseline="0" dirty="0" err="1" smtClean="0"/>
+              <a:t>that</a:t>
+            </a:r>
+            <a:r>
+              <a:rPr lang="fr-FR" baseline="0" dirty="0" smtClean="0"/>
+              <a:t> supports </a:t>
+            </a:r>
+            <a:r>
+              <a:rPr lang="fr-FR" baseline="0" dirty="0" err="1" smtClean="0"/>
+              <a:t>Ravenscar</a:t>
+            </a:r>
+            <a:r>
+              <a:rPr lang="fr-FR" baseline="0" dirty="0" smtClean="0"/>
+              <a:t> (</a:t>
+            </a:r>
+            <a:r>
+              <a:rPr lang="fr-FR" baseline="0" dirty="0" err="1" smtClean="0"/>
+              <a:t>safe</a:t>
+            </a:r>
+            <a:r>
+              <a:rPr lang="fr-FR" baseline="0" dirty="0" smtClean="0"/>
+              <a:t> </a:t>
+            </a:r>
+            <a:r>
+              <a:rPr lang="fr-FR" baseline="0" dirty="0" err="1" smtClean="0"/>
+              <a:t>tasking</a:t>
+            </a:r>
+            <a:r>
+              <a:rPr lang="fr-FR" baseline="0" dirty="0" smtClean="0"/>
+              <a:t> in Ada)</a:t>
+            </a:r>
+          </a:p>
+          <a:p>
+            <a:r>
+              <a:rPr lang="fr-FR" baseline="0" dirty="0" err="1" smtClean="0"/>
+              <a:t>Anthony’s</a:t>
+            </a:r>
+            <a:r>
+              <a:rPr lang="fr-FR" baseline="0" dirty="0" smtClean="0"/>
+              <a:t> </a:t>
+            </a:r>
+            <a:r>
+              <a:rPr lang="fr-FR" baseline="0" dirty="0" err="1" smtClean="0"/>
+              <a:t>assessment</a:t>
+            </a:r>
+            <a:r>
+              <a:rPr lang="fr-FR" baseline="0" dirty="0" smtClean="0"/>
+              <a:t> of </a:t>
+            </a:r>
+            <a:r>
+              <a:rPr lang="fr-FR" baseline="0" dirty="0" err="1" smtClean="0"/>
+              <a:t>using</a:t>
+            </a:r>
+            <a:r>
+              <a:rPr lang="fr-FR" baseline="0" dirty="0" smtClean="0"/>
+              <a:t> SPARK </a:t>
+            </a:r>
+            <a:r>
+              <a:rPr lang="fr-FR" baseline="0" dirty="0" err="1" smtClean="0"/>
+              <a:t>was</a:t>
+            </a:r>
+            <a:r>
+              <a:rPr lang="fr-FR" baseline="0" dirty="0" smtClean="0"/>
+              <a:t> </a:t>
+            </a:r>
+            <a:r>
+              <a:rPr lang="fr-FR" baseline="0" dirty="0" err="1" smtClean="0"/>
+              <a:t>that</a:t>
+            </a:r>
+            <a:r>
+              <a:rPr lang="fr-FR" baseline="0" dirty="0" smtClean="0"/>
+              <a:t> </a:t>
+            </a:r>
+            <a:r>
+              <a:rPr lang="fr-FR" baseline="0" dirty="0" err="1" smtClean="0"/>
+              <a:t>it</a:t>
+            </a:r>
+            <a:r>
+              <a:rPr lang="fr-FR" baseline="0" dirty="0" smtClean="0"/>
+              <a:t> </a:t>
+            </a:r>
+            <a:r>
+              <a:rPr lang="fr-FR" baseline="0" dirty="0" err="1" smtClean="0"/>
+              <a:t>was</a:t>
+            </a:r>
+            <a:r>
+              <a:rPr lang="fr-FR" baseline="0" dirty="0" smtClean="0"/>
+              <a:t> intuitive! Not the </a:t>
+            </a:r>
+            <a:r>
+              <a:rPr lang="fr-FR" baseline="0" dirty="0" err="1" smtClean="0"/>
+              <a:t>typical</a:t>
+            </a:r>
+            <a:r>
+              <a:rPr lang="fr-FR" baseline="0" dirty="0" smtClean="0"/>
+              <a:t> feedback </a:t>
+            </a:r>
+            <a:r>
+              <a:rPr lang="fr-FR" baseline="0" dirty="0" err="1" smtClean="0"/>
+              <a:t>from</a:t>
+            </a:r>
+            <a:r>
+              <a:rPr lang="fr-FR" baseline="0" dirty="0" smtClean="0"/>
+              <a:t> people </a:t>
+            </a:r>
+            <a:r>
+              <a:rPr lang="fr-FR" baseline="0" dirty="0" err="1" smtClean="0"/>
+              <a:t>who</a:t>
+            </a:r>
+            <a:r>
+              <a:rPr lang="fr-FR" baseline="0" dirty="0" smtClean="0"/>
+              <a:t> use </a:t>
+            </a:r>
+            <a:r>
+              <a:rPr lang="fr-FR" baseline="0" dirty="0" err="1" smtClean="0"/>
+              <a:t>formal</a:t>
+            </a:r>
+            <a:r>
+              <a:rPr lang="fr-FR" baseline="0" dirty="0" smtClean="0"/>
+              <a:t> </a:t>
+            </a:r>
+            <a:r>
+              <a:rPr lang="fr-FR" baseline="0" dirty="0" err="1" smtClean="0"/>
+              <a:t>methods</a:t>
+            </a:r>
+            <a:r>
+              <a:rPr lang="fr-FR" baseline="0" dirty="0" smtClean="0"/>
+              <a:t> </a:t>
+            </a:r>
+            <a:r>
+              <a:rPr lang="fr-FR" baseline="0" dirty="0" err="1" smtClean="0"/>
+              <a:t>tools</a:t>
+            </a:r>
+            <a:r>
+              <a:rPr lang="fr-FR" baseline="0" dirty="0" smtClean="0"/>
+              <a:t>.</a:t>
+            </a:r>
+          </a:p>
+          <a:p>
+            <a:r>
+              <a:rPr lang="fr-FR" baseline="0" dirty="0" err="1" smtClean="0"/>
+              <a:t>See</a:t>
+            </a:r>
+            <a:r>
+              <a:rPr lang="fr-FR" baseline="0" dirty="0" smtClean="0"/>
+              <a:t> </a:t>
+            </a:r>
+            <a:r>
+              <a:rPr lang="fr-FR" baseline="0" dirty="0" err="1" smtClean="0"/>
+              <a:t>demo</a:t>
+            </a:r>
+            <a:endParaRPr lang="fr-FR" dirty="0"/>
+          </a:p>
+        </p:txBody>
+      </p:sp>
+      <p:sp>
+        <p:nvSpPr>
+          <p:cNvPr id="4" name="Espace réservé du numéro de diapositive 3"/>
+          <p:cNvSpPr>
+            <a:spLocks noGrp="1"/>
+          </p:cNvSpPr>
+          <p:nvPr>
+            <p:ph type="sldNum" sz="quarter" idx="10"/>
+          </p:nvPr>
+        </p:nvSpPr>
+        <p:spPr/>
+        <p:txBody>
+          <a:bodyPr/>
+          <a:lstStyle/>
+          <a:p>
+            <a:fld id="{75693FD4-8F83-4EF7-AC3F-0DC0388986B0}" type="slidenum">
+              <a:rPr lang="en-US" smtClean="0"/>
+              <a:pPr/>
+              <a:t>5</a:t>
+            </a:fld>
+            <a:endParaRPr lang="en-US" dirty="0"/>
+          </a:p>
+        </p:txBody>
+      </p:sp>
+    </p:spTree>
+    <p:extLst>
+      <p:ext uri="{BB962C8B-B14F-4D97-AF65-F5344CB8AC3E}">
+        <p14:creationId xmlns:p14="http://schemas.microsoft.com/office/powerpoint/2010/main" val="832336551"/>
+      </p:ext>
+    </p:extLst>
+  </p:cSld>
+  <p:clrMapOvr>
+    <a:masterClrMapping/>
+  </p:clrMapOvr>
+</p:notes>
+</file>
+
+<file path=ppt/notesSlides/notesSlide5.xml><?xml version="1.0" encoding="utf-8"?>
+<p:notes xmlns:a="http://schemas.openxmlformats.org/drawingml/2006/main" xmlns:r="http://schemas.openxmlformats.org/officeDocument/2006/relationships" xmlns:p="http://schemas.openxmlformats.org/presentationml/2006/main">
+  <p:cSld>
+    <p:spTree>
+      <p:nvGrpSpPr>
+        <p:cNvPr id="1" name=""/>
+        <p:cNvGrpSpPr/>
+        <p:nvPr/>
+      </p:nvGrpSpPr>
+      <p:grpSpPr>
+        <a:xfrm>
+          <a:off x="0" y="0"/>
+          <a:ext cx="0" cy="0"/>
+          <a:chOff x="0" y="0"/>
+          <a:chExt cx="0" cy="0"/>
+        </a:xfrm>
+      </p:grpSpPr>
+      <p:sp>
+        <p:nvSpPr>
+          <p:cNvPr id="2" name="Espace réservé de l'image des diapositives 1"/>
+          <p:cNvSpPr>
+            <a:spLocks noGrp="1" noRot="1" noChangeAspect="1"/>
+          </p:cNvSpPr>
+          <p:nvPr>
+            <p:ph type="sldImg"/>
+          </p:nvPr>
+        </p:nvSpPr>
+        <p:spPr/>
+      </p:sp>
+      <p:sp>
+        <p:nvSpPr>
+          <p:cNvPr id="3" name="Espace réservé des commentaires 2"/>
+          <p:cNvSpPr>
+            <a:spLocks noGrp="1"/>
+          </p:cNvSpPr>
+          <p:nvPr>
+            <p:ph type="body" idx="1"/>
+          </p:nvPr>
+        </p:nvSpPr>
+        <p:spPr/>
+        <p:txBody>
+          <a:bodyPr/>
+          <a:lstStyle/>
+          <a:p>
+            <a:r>
+              <a:rPr lang="fr-FR" dirty="0" err="1" smtClean="0"/>
+              <a:t>Two</a:t>
+            </a:r>
+            <a:r>
+              <a:rPr lang="fr-FR" dirty="0" smtClean="0"/>
+              <a:t> </a:t>
+            </a:r>
+            <a:r>
+              <a:rPr lang="fr-FR" dirty="0" err="1" smtClean="0"/>
+              <a:t>features</a:t>
+            </a:r>
+            <a:r>
+              <a:rPr lang="fr-FR" baseline="0" dirty="0" smtClean="0"/>
+              <a:t> </a:t>
+            </a:r>
+            <a:r>
+              <a:rPr lang="fr-FR" baseline="0" dirty="0" err="1" smtClean="0"/>
+              <a:t>make</a:t>
+            </a:r>
+            <a:r>
+              <a:rPr lang="fr-FR" baseline="0" dirty="0" smtClean="0"/>
+              <a:t> SPARK </a:t>
+            </a:r>
+            <a:r>
+              <a:rPr lang="fr-FR" baseline="0" dirty="0" err="1" smtClean="0"/>
+              <a:t>easy</a:t>
+            </a:r>
+            <a:r>
+              <a:rPr lang="fr-FR" baseline="0" dirty="0" smtClean="0"/>
+              <a:t> to </a:t>
+            </a:r>
+            <a:r>
+              <a:rPr lang="fr-FR" baseline="0" dirty="0" err="1" smtClean="0"/>
+              <a:t>adopt</a:t>
+            </a:r>
+            <a:r>
+              <a:rPr lang="fr-FR" baseline="0" dirty="0" smtClean="0"/>
+              <a:t> in </a:t>
+            </a:r>
+            <a:r>
+              <a:rPr lang="fr-FR" baseline="0" dirty="0" err="1" smtClean="0"/>
+              <a:t>your</a:t>
+            </a:r>
+            <a:r>
+              <a:rPr lang="fr-FR" baseline="0" dirty="0" smtClean="0"/>
+              <a:t> </a:t>
+            </a:r>
+            <a:r>
+              <a:rPr lang="fr-FR" baseline="0" dirty="0" err="1" smtClean="0"/>
+              <a:t>processes</a:t>
+            </a:r>
+            <a:r>
+              <a:rPr lang="fr-FR" baseline="0" dirty="0" smtClean="0"/>
+              <a:t>:</a:t>
+            </a:r>
+          </a:p>
+          <a:p>
+            <a:pPr marL="171450" indent="-171450">
+              <a:buFont typeface="Arial"/>
+              <a:buChar char="•"/>
+            </a:pPr>
+            <a:r>
+              <a:rPr lang="fr-FR" baseline="0" dirty="0" smtClean="0"/>
+              <a:t>SPARK </a:t>
+            </a:r>
+            <a:r>
+              <a:rPr lang="fr-FR" baseline="0" dirty="0" err="1" smtClean="0"/>
+              <a:t>is</a:t>
+            </a:r>
+            <a:r>
+              <a:rPr lang="fr-FR" baseline="0" dirty="0" smtClean="0"/>
+              <a:t> Ada! </a:t>
+            </a:r>
+          </a:p>
+          <a:p>
+            <a:pPr marL="171450" indent="-171450">
+              <a:buFont typeface="Arial"/>
+              <a:buChar char="•"/>
+            </a:pPr>
+            <a:r>
+              <a:rPr lang="fr-FR" baseline="0" dirty="0" smtClean="0"/>
+              <a:t>SPARK </a:t>
+            </a:r>
+            <a:r>
+              <a:rPr lang="fr-FR" baseline="0" dirty="0" err="1" smtClean="0"/>
+              <a:t>is</a:t>
+            </a:r>
+            <a:r>
+              <a:rPr lang="fr-FR" baseline="0" dirty="0" smtClean="0"/>
+              <a:t> AdaCore </a:t>
+            </a:r>
+            <a:r>
+              <a:rPr lang="fr-FR" baseline="0" dirty="0" err="1" smtClean="0"/>
+              <a:t>technology</a:t>
+            </a:r>
+            <a:r>
+              <a:rPr lang="fr-FR" baseline="0" dirty="0" smtClean="0"/>
+              <a:t>!</a:t>
+            </a:r>
+            <a:endParaRPr lang="fr-FR" dirty="0"/>
+          </a:p>
+        </p:txBody>
+      </p:sp>
+      <p:sp>
+        <p:nvSpPr>
+          <p:cNvPr id="4" name="Espace réservé du numéro de diapositive 3"/>
+          <p:cNvSpPr>
+            <a:spLocks noGrp="1"/>
+          </p:cNvSpPr>
+          <p:nvPr>
+            <p:ph type="sldNum" sz="quarter" idx="10"/>
+          </p:nvPr>
+        </p:nvSpPr>
+        <p:spPr/>
+        <p:txBody>
+          <a:bodyPr/>
+          <a:lstStyle/>
+          <a:p>
+            <a:fld id="{75693FD4-8F83-4EF7-AC3F-0DC0388986B0}" type="slidenum">
+              <a:rPr lang="en-US" smtClean="0"/>
+              <a:pPr/>
+              <a:t>6</a:t>
+            </a:fld>
+            <a:endParaRPr lang="en-US" dirty="0"/>
+          </a:p>
+        </p:txBody>
+      </p:sp>
+    </p:spTree>
+    <p:extLst>
+      <p:ext uri="{BB962C8B-B14F-4D97-AF65-F5344CB8AC3E}">
+        <p14:creationId xmlns:p14="http://schemas.microsoft.com/office/powerpoint/2010/main" val="1037072626"/>
+      </p:ext>
+    </p:extLst>
+  </p:cSld>
+  <p:clrMapOvr>
+    <a:masterClrMapping/>
+  </p:clrMapOvr>
+</p:notes>
+</file>
+
+<file path=ppt/notesSlides/notesSlide6.xml><?xml version="1.0" encoding="utf-8"?>
+<p:notes xmlns:a="http://schemas.openxmlformats.org/drawingml/2006/main" xmlns:r="http://schemas.openxmlformats.org/officeDocument/2006/relationships" xmlns:p="http://schemas.openxmlformats.org/presentationml/2006/main">
+  <p:cSld>
+    <p:spTree>
+      <p:nvGrpSpPr>
+        <p:cNvPr id="1" name=""/>
+        <p:cNvGrpSpPr/>
+        <p:nvPr/>
+      </p:nvGrpSpPr>
+      <p:grpSpPr>
+        <a:xfrm>
+          <a:off x="0" y="0"/>
+          <a:ext cx="0" cy="0"/>
+          <a:chOff x="0" y="0"/>
+          <a:chExt cx="0" cy="0"/>
+        </a:xfrm>
+      </p:grpSpPr>
+      <p:sp>
+        <p:nvSpPr>
+          <p:cNvPr id="2" name="Espace réservé de l'image des diapositives 1"/>
+          <p:cNvSpPr>
+            <a:spLocks noGrp="1" noRot="1" noChangeAspect="1"/>
+          </p:cNvSpPr>
+          <p:nvPr>
+            <p:ph type="sldImg"/>
+          </p:nvPr>
+        </p:nvSpPr>
+        <p:spPr/>
+      </p:sp>
+      <p:sp>
+        <p:nvSpPr>
+          <p:cNvPr id="3" name="Espace réservé des commentaires 2"/>
+          <p:cNvSpPr>
+            <a:spLocks noGrp="1"/>
+          </p:cNvSpPr>
+          <p:nvPr>
+            <p:ph type="body" idx="1"/>
+          </p:nvPr>
+        </p:nvSpPr>
+        <p:spPr/>
+        <p:txBody>
+          <a:bodyPr/>
+          <a:lstStyle/>
+          <a:p>
+            <a:r>
+              <a:rPr lang="fr-FR" dirty="0" err="1" smtClean="0"/>
+              <a:t>Two</a:t>
+            </a:r>
+            <a:r>
+              <a:rPr lang="fr-FR" dirty="0" smtClean="0"/>
+              <a:t> </a:t>
+            </a:r>
+            <a:r>
+              <a:rPr lang="fr-FR" dirty="0" err="1" smtClean="0"/>
+              <a:t>features</a:t>
+            </a:r>
+            <a:r>
+              <a:rPr lang="fr-FR" dirty="0" smtClean="0"/>
+              <a:t> of SPARK </a:t>
+            </a:r>
+            <a:r>
+              <a:rPr lang="fr-FR" dirty="0" err="1" smtClean="0"/>
+              <a:t>make</a:t>
+            </a:r>
+            <a:r>
+              <a:rPr lang="fr-FR" dirty="0" smtClean="0"/>
+              <a:t> </a:t>
+            </a:r>
+            <a:r>
+              <a:rPr lang="fr-FR" dirty="0" err="1" smtClean="0"/>
+              <a:t>it</a:t>
+            </a:r>
+            <a:r>
+              <a:rPr lang="fr-FR" baseline="0" dirty="0" smtClean="0"/>
+              <a:t> </a:t>
+            </a:r>
+            <a:r>
+              <a:rPr lang="fr-FR" baseline="0" dirty="0" err="1" smtClean="0"/>
+              <a:t>easy</a:t>
+            </a:r>
+            <a:r>
+              <a:rPr lang="fr-FR" baseline="0" dirty="0" smtClean="0"/>
+              <a:t> to use:</a:t>
+            </a:r>
+          </a:p>
+          <a:p>
+            <a:pPr marL="171450" indent="-171450">
+              <a:buFont typeface="Arial"/>
+              <a:buChar char="•"/>
+            </a:pPr>
+            <a:r>
+              <a:rPr lang="fr-FR" dirty="0" smtClean="0"/>
+              <a:t>SPARK </a:t>
+            </a:r>
+            <a:r>
+              <a:rPr lang="fr-FR" dirty="0" err="1" smtClean="0"/>
+              <a:t>listens</a:t>
+            </a:r>
+            <a:r>
+              <a:rPr lang="fr-FR" baseline="0" dirty="0" smtClean="0"/>
+              <a:t> to </a:t>
+            </a:r>
+            <a:r>
+              <a:rPr lang="fr-FR" baseline="0" dirty="0" err="1" smtClean="0"/>
+              <a:t>you</a:t>
+            </a:r>
+            <a:r>
+              <a:rPr lang="fr-FR" baseline="0" dirty="0" smtClean="0"/>
+              <a:t>!</a:t>
+            </a:r>
+          </a:p>
+          <a:p>
+            <a:pPr marL="171450" indent="-171450">
+              <a:buFont typeface="Arial"/>
+              <a:buChar char="•"/>
+            </a:pPr>
+            <a:r>
+              <a:rPr lang="fr-FR" dirty="0" smtClean="0"/>
+              <a:t>SPARK</a:t>
+            </a:r>
+            <a:r>
+              <a:rPr lang="fr-FR" baseline="0" dirty="0" smtClean="0"/>
+              <a:t> </a:t>
+            </a:r>
+            <a:r>
+              <a:rPr lang="fr-FR" baseline="0" dirty="0" err="1" smtClean="0"/>
+              <a:t>talks</a:t>
+            </a:r>
+            <a:r>
+              <a:rPr lang="fr-FR" baseline="0" dirty="0" smtClean="0"/>
+              <a:t> to </a:t>
+            </a:r>
+            <a:r>
+              <a:rPr lang="fr-FR" baseline="0" dirty="0" err="1" smtClean="0"/>
+              <a:t>you</a:t>
+            </a:r>
+            <a:r>
+              <a:rPr lang="fr-FR" baseline="0" dirty="0" smtClean="0"/>
+              <a:t>!</a:t>
+            </a:r>
+            <a:endParaRPr lang="fr-FR" dirty="0"/>
+          </a:p>
+        </p:txBody>
+      </p:sp>
+      <p:sp>
+        <p:nvSpPr>
+          <p:cNvPr id="4" name="Espace réservé du numéro de diapositive 3"/>
+          <p:cNvSpPr>
+            <a:spLocks noGrp="1"/>
+          </p:cNvSpPr>
+          <p:nvPr>
+            <p:ph type="sldNum" sz="quarter" idx="10"/>
+          </p:nvPr>
+        </p:nvSpPr>
+        <p:spPr/>
+        <p:txBody>
+          <a:bodyPr/>
+          <a:lstStyle/>
+          <a:p>
+            <a:fld id="{75693FD4-8F83-4EF7-AC3F-0DC0388986B0}" type="slidenum">
+              <a:rPr lang="en-US" smtClean="0"/>
+              <a:pPr/>
+              <a:t>7</a:t>
+            </a:fld>
+            <a:endParaRPr lang="en-US" dirty="0"/>
+          </a:p>
+        </p:txBody>
+      </p:sp>
+    </p:spTree>
+    <p:extLst>
+      <p:ext uri="{BB962C8B-B14F-4D97-AF65-F5344CB8AC3E}">
+        <p14:creationId xmlns:p14="http://schemas.microsoft.com/office/powerpoint/2010/main" val="366163572"/>
+      </p:ext>
+    </p:extLst>
+  </p:cSld>
+  <p:clrMapOvr>
+    <a:masterClrMapping/>
+  </p:clrMapOvr>
+</p:notes>
+</file>
+
+<file path=ppt/notesSlides/notesSlide7.xml><?xml version="1.0" encoding="utf-8"?>
+<p:notes xmlns:a="http://schemas.openxmlformats.org/drawingml/2006/main" xmlns:r="http://schemas.openxmlformats.org/officeDocument/2006/relationships" xmlns:p="http://schemas.openxmlformats.org/presentationml/2006/main">
+  <p:cSld>
+    <p:spTree>
+      <p:nvGrpSpPr>
+        <p:cNvPr id="1" name=""/>
+        <p:cNvGrpSpPr/>
+        <p:nvPr/>
+      </p:nvGrpSpPr>
+      <p:grpSpPr>
+        <a:xfrm>
+          <a:off x="0" y="0"/>
+          <a:ext cx="0" cy="0"/>
+          <a:chOff x="0" y="0"/>
+          <a:chExt cx="0" cy="0"/>
+        </a:xfrm>
+      </p:grpSpPr>
+      <p:sp>
+        <p:nvSpPr>
+          <p:cNvPr id="2" name="Espace réservé de l'image des diapositives 1"/>
+          <p:cNvSpPr>
+            <a:spLocks noGrp="1" noRot="1" noChangeAspect="1"/>
+          </p:cNvSpPr>
+          <p:nvPr>
+            <p:ph type="sldImg"/>
+          </p:nvPr>
+        </p:nvSpPr>
+        <p:spPr/>
+      </p:sp>
+      <p:sp>
+        <p:nvSpPr>
+          <p:cNvPr id="3" name="Espace réservé des commentaires 2"/>
+          <p:cNvSpPr>
+            <a:spLocks noGrp="1"/>
+          </p:cNvSpPr>
+          <p:nvPr>
+            <p:ph type="body" idx="1"/>
+          </p:nvPr>
+        </p:nvSpPr>
+        <p:spPr/>
+        <p:txBody>
+          <a:bodyPr/>
+          <a:lstStyle/>
+          <a:p>
+            <a:r>
+              <a:rPr lang="fr-FR" dirty="0" err="1" smtClean="0"/>
+              <a:t>See</a:t>
+            </a:r>
+            <a:r>
+              <a:rPr lang="fr-FR" dirty="0" smtClean="0"/>
+              <a:t> change for </a:t>
+            </a:r>
+            <a:r>
+              <a:rPr lang="fr-FR" dirty="0" err="1" smtClean="0"/>
+              <a:t>fix</a:t>
+            </a:r>
+            <a:endParaRPr lang="fr-FR" dirty="0"/>
+          </a:p>
+        </p:txBody>
+      </p:sp>
+      <p:sp>
+        <p:nvSpPr>
+          <p:cNvPr id="4" name="Espace réservé du numéro de diapositive 3"/>
+          <p:cNvSpPr>
+            <a:spLocks noGrp="1"/>
+          </p:cNvSpPr>
+          <p:nvPr>
+            <p:ph type="sldNum" sz="quarter" idx="10"/>
+          </p:nvPr>
+        </p:nvSpPr>
+        <p:spPr/>
+        <p:txBody>
+          <a:bodyPr/>
+          <a:lstStyle/>
+          <a:p>
+            <a:fld id="{75693FD4-8F83-4EF7-AC3F-0DC0388986B0}" type="slidenum">
+              <a:rPr lang="en-US" smtClean="0"/>
+              <a:pPr/>
+              <a:t>23</a:t>
+            </a:fld>
+            <a:endParaRPr lang="en-US" dirty="0"/>
+          </a:p>
+        </p:txBody>
+      </p:sp>
+    </p:spTree>
+    <p:extLst>
+      <p:ext uri="{BB962C8B-B14F-4D97-AF65-F5344CB8AC3E}">
+        <p14:creationId xmlns:p14="http://schemas.microsoft.com/office/powerpoint/2010/main" val="2731003155"/>
+      </p:ext>
+    </p:extLst>
+  </p:cSld>
+  <p:clrMapOvr>
+    <a:masterClrMapping/>
+  </p:clrMapOvr>
+</p:notes>
+</file>
+
+<file path=ppt/notesSlides/notesSlide8.xml><?xml version="1.0" encoding="utf-8"?>
+<p:notes xmlns:a="http://schemas.openxmlformats.org/drawingml/2006/main" xmlns:r="http://schemas.openxmlformats.org/officeDocument/2006/relationships" xmlns:p="http://schemas.openxmlformats.org/presentationml/2006/main">
+  <p:cSld>
+    <p:spTree>
+      <p:nvGrpSpPr>
+        <p:cNvPr id="1" name=""/>
+        <p:cNvGrpSpPr/>
+        <p:nvPr/>
+      </p:nvGrpSpPr>
+      <p:grpSpPr>
+        <a:xfrm>
+          <a:off x="0" y="0"/>
+          <a:ext cx="0" cy="0"/>
+          <a:chOff x="0" y="0"/>
+          <a:chExt cx="0" cy="0"/>
+        </a:xfrm>
+      </p:grpSpPr>
+      <p:sp>
+        <p:nvSpPr>
+          <p:cNvPr id="2" name="Espace réservé de l'image des diapositives 1"/>
+          <p:cNvSpPr>
+            <a:spLocks noGrp="1" noRot="1" noChangeAspect="1"/>
+          </p:cNvSpPr>
+          <p:nvPr>
+            <p:ph type="sldImg"/>
+          </p:nvPr>
+        </p:nvSpPr>
+        <p:spPr/>
+      </p:sp>
+      <p:sp>
+        <p:nvSpPr>
+          <p:cNvPr id="3" name="Espace réservé des commentaires 2"/>
+          <p:cNvSpPr>
+            <a:spLocks noGrp="1"/>
+          </p:cNvSpPr>
+          <p:nvPr>
+            <p:ph type="body" idx="1"/>
+          </p:nvPr>
+        </p:nvSpPr>
+        <p:spPr/>
+        <p:txBody>
+          <a:bodyPr/>
+          <a:lstStyle/>
+          <a:p>
+            <a:r>
+              <a:rPr lang="fr-FR" dirty="0" err="1" smtClean="0"/>
+              <a:t>Explain</a:t>
+            </a:r>
+            <a:r>
+              <a:rPr lang="fr-FR" dirty="0" smtClean="0"/>
+              <a:t> </a:t>
+            </a:r>
+            <a:r>
+              <a:rPr lang="fr-FR" dirty="0" err="1" smtClean="0"/>
+              <a:t>benefit</a:t>
+            </a:r>
+            <a:r>
+              <a:rPr lang="fr-FR" dirty="0" smtClean="0"/>
+              <a:t> of </a:t>
+            </a:r>
+            <a:r>
+              <a:rPr lang="fr-FR" dirty="0" err="1" smtClean="0"/>
+              <a:t>CodePeer</a:t>
+            </a:r>
+            <a:endParaRPr lang="fr-FR" dirty="0"/>
+          </a:p>
+        </p:txBody>
+      </p:sp>
+      <p:sp>
+        <p:nvSpPr>
+          <p:cNvPr id="4" name="Espace réservé du numéro de diapositive 3"/>
+          <p:cNvSpPr>
+            <a:spLocks noGrp="1"/>
+          </p:cNvSpPr>
+          <p:nvPr>
+            <p:ph type="sldNum" sz="quarter" idx="10"/>
+          </p:nvPr>
+        </p:nvSpPr>
+        <p:spPr/>
+        <p:txBody>
+          <a:bodyPr/>
+          <a:lstStyle/>
+          <a:p>
+            <a:fld id="{75693FD4-8F83-4EF7-AC3F-0DC0388986B0}" type="slidenum">
+              <a:rPr lang="en-US" smtClean="0"/>
+              <a:pPr/>
+              <a:t>24</a:t>
+            </a:fld>
+            <a:endParaRPr lang="en-US" dirty="0"/>
+          </a:p>
+        </p:txBody>
+      </p:sp>
+    </p:spTree>
+    <p:extLst>
+      <p:ext uri="{BB962C8B-B14F-4D97-AF65-F5344CB8AC3E}">
+        <p14:creationId xmlns:p14="http://schemas.microsoft.com/office/powerpoint/2010/main" val="3410565617"/>
+      </p:ext>
+    </p:extLst>
+  </p:cSld>
+  <p:clrMapOvr>
+    <a:masterClrMapping/>
+  </p:clrMapOvr>
+</p:notes>
+</file>
+
+<file path=ppt/notesSlides/notesSlide9.xml><?xml version="1.0" encoding="utf-8"?>
+<p:notes xmlns:a="http://schemas.openxmlformats.org/drawingml/2006/main" xmlns:r="http://schemas.openxmlformats.org/officeDocument/2006/relationships" xmlns:p="http://schemas.openxmlformats.org/presentationml/2006/main">
+  <p:cSld>
+    <p:spTree>
+      <p:nvGrpSpPr>
+        <p:cNvPr id="1" name=""/>
+        <p:cNvGrpSpPr/>
+        <p:nvPr/>
+      </p:nvGrpSpPr>
+      <p:grpSpPr>
+        <a:xfrm>
+          <a:off x="0" y="0"/>
+          <a:ext cx="0" cy="0"/>
+          <a:chOff x="0" y="0"/>
+          <a:chExt cx="0" cy="0"/>
+        </a:xfrm>
+      </p:grpSpPr>
+      <p:sp>
+        <p:nvSpPr>
+          <p:cNvPr id="2" name="Slide Image Placeholder 1"/>
+          <p:cNvSpPr>
+            <a:spLocks noGrp="1" noRot="1" noChangeAspect="1"/>
+          </p:cNvSpPr>
+          <p:nvPr>
+            <p:ph type="sldImg"/>
+          </p:nvPr>
+        </p:nvSpPr>
         <p:spPr>
           <a:xfrm>
-            <a:off x="307492" y="4139472"/>
-            <a:ext cx="6261652" cy="4593861"/>
+            <a:off x="685800" y="685800"/>
+            <a:ext cx="5486400" cy="3429000"/>
           </a:xfrm>
-          <a:noFill/>
-          <a:ln/>
         </p:spPr>
+      </p:sp>
+      <p:sp>
+        <p:nvSpPr>
+          <p:cNvPr id="3" name="Notes Placeholder 2"/>
+          <p:cNvSpPr>
+            <a:spLocks noGrp="1"/>
+          </p:cNvSpPr>
+          <p:nvPr>
+            <p:ph type="body" idx="1"/>
+          </p:nvPr>
+        </p:nvSpPr>
+        <p:spPr/>
+        <p:txBody>
+          <a:bodyPr>
+            <a:normAutofit/>
+          </a:bodyPr>
+          <a:lstStyle/>
+          <a:p>
+            <a:r>
+              <a:rPr lang="en-US" dirty="0" smtClean="0"/>
+              <a:t>Summarize presentation content by restating the important points from the lessons.</a:t>
+            </a:r>
+          </a:p>
+          <a:p>
+            <a:r>
+              <a:rPr lang="en-US" dirty="0" smtClean="0"/>
+              <a:t>What do you want the audience to remember when they leave your </a:t>
+            </a:r>
+            <a:r>
+              <a:rPr lang="en-US" smtClean="0"/>
+              <a:t>presentation?</a:t>
+            </a:r>
+            <a:endParaRPr lang="en-US" dirty="0" smtClean="0"/>
+          </a:p>
+        </p:txBody>
+      </p:sp>
+      <p:sp>
+        <p:nvSpPr>
+          <p:cNvPr id="4" name="Slide Number Placeholder 3"/>
+          <p:cNvSpPr>
+            <a:spLocks noGrp="1"/>
+          </p:cNvSpPr>
+          <p:nvPr>
+            <p:ph type="sldNum" sz="quarter" idx="10"/>
+          </p:nvPr>
+        </p:nvSpPr>
+        <p:spPr/>
         <p:txBody>
           <a:bodyPr/>
           <a:lstStyle/>
           <a:p>
-            <a:pPr>
-              <a:buFontTx/>
-              <a:buNone/>
-            </a:pPr>
-            <a:endParaRPr lang="en-US" dirty="0" smtClean="0"/>
+            <a:fld id="{EC6EAC7D-5A89-47C2-8ABA-56C9C2DEF7A4}" type="slidenum">
+              <a:rPr lang="en-US" smtClean="0"/>
+              <a:pPr/>
+              <a:t>25</a:t>
+            </a:fld>
+            <a:endParaRPr lang="en-US" dirty="0"/>
           </a:p>
         </p:txBody>
       </p:sp>
@@ -1490,7 +2943,7 @@
             <a:fld id="{757B281C-5159-4971-8228-52B9A72E9ED2}" type="datetimeFigureOut">
               <a:rPr lang="en-US" smtClean="0"/>
               <a:pPr/>
-              <a:t>04/09/15</a:t>
+              <a:t>10/09/15</a:t>
             </a:fld>
             <a:endParaRPr lang="en-US" dirty="0"/>
           </a:p>
@@ -1608,7 +3061,7 @@
             <a:fld id="{757B281C-5159-4971-8228-52B9A72E9ED2}" type="datetimeFigureOut">
               <a:rPr lang="en-US" smtClean="0"/>
               <a:pPr/>
-              <a:t>04/09/15</a:t>
+              <a:t>10/09/15</a:t>
             </a:fld>
             <a:endParaRPr lang="en-US" dirty="0"/>
           </a:p>
@@ -1710,7 +3163,7 @@
             <a:fld id="{757B281C-5159-4971-8228-52B9A72E9ED2}" type="datetimeFigureOut">
               <a:rPr lang="en-US" smtClean="0"/>
               <a:pPr/>
-              <a:t>04/09/15</a:t>
+              <a:t>10/09/15</a:t>
             </a:fld>
             <a:endParaRPr lang="en-US" dirty="0"/>
           </a:p>
@@ -1817,7 +3270,7 @@
             <a:fld id="{757B281C-5159-4971-8228-52B9A72E9ED2}" type="datetimeFigureOut">
               <a:rPr lang="en-US" smtClean="0"/>
               <a:pPr/>
-              <a:t>04/09/15</a:t>
+              <a:t>10/09/15</a:t>
             </a:fld>
             <a:endParaRPr lang="en-US" dirty="0"/>
           </a:p>
@@ -1929,7 +3382,7 @@
             <a:fld id="{757B281C-5159-4971-8228-52B9A72E9ED2}" type="datetimeFigureOut">
               <a:rPr lang="en-US" smtClean="0"/>
               <a:pPr/>
-              <a:t>04/09/15</a:t>
+              <a:t>10/09/15</a:t>
             </a:fld>
             <a:endParaRPr lang="en-US" dirty="0"/>
           </a:p>
@@ -2069,7 +3522,7 @@
             <a:fld id="{757B281C-5159-4971-8228-52B9A72E9ED2}" type="datetimeFigureOut">
               <a:rPr lang="en-US" smtClean="0"/>
               <a:pPr/>
-              <a:t>04/09/15</a:t>
+              <a:t>10/09/15</a:t>
             </a:fld>
             <a:endParaRPr lang="en-US" dirty="0"/>
           </a:p>
@@ -2341,7 +3794,7 @@
             <a:fld id="{757B281C-5159-4971-8228-52B9A72E9ED2}" type="datetimeFigureOut">
               <a:rPr lang="en-US" smtClean="0"/>
               <a:pPr/>
-              <a:t>04/09/15</a:t>
+              <a:t>10/09/15</a:t>
             </a:fld>
             <a:endParaRPr lang="en-US" dirty="0"/>
           </a:p>
@@ -2657,7 +4110,7 @@
             <a:fld id="{757B281C-5159-4971-8228-52B9A72E9ED2}" type="datetimeFigureOut">
               <a:rPr lang="en-US" smtClean="0"/>
               <a:pPr/>
-              <a:t>04/09/15</a:t>
+              <a:t>10/09/15</a:t>
             </a:fld>
             <a:endParaRPr lang="en-US" dirty="0"/>
           </a:p>
@@ -3102,7 +4555,7 @@
             <a:fld id="{757B281C-5159-4971-8228-52B9A72E9ED2}" type="datetimeFigureOut">
               <a:rPr lang="en-US" smtClean="0"/>
               <a:pPr/>
-              <a:t>04/09/15</a:t>
+              <a:t>10/09/15</a:t>
             </a:fld>
             <a:endParaRPr lang="en-US" dirty="0"/>
           </a:p>
@@ -3381,7 +4834,7 @@
             <a:fld id="{757B281C-5159-4971-8228-52B9A72E9ED2}" type="datetimeFigureOut">
               <a:rPr lang="en-US" smtClean="0"/>
               <a:pPr/>
-              <a:t>04/09/15</a:t>
+              <a:t>10/09/15</a:t>
             </a:fld>
             <a:endParaRPr lang="en-US" dirty="0"/>
           </a:p>
@@ -3645,7 +5098,7 @@
             <a:fld id="{757B281C-5159-4971-8228-52B9A72E9ED2}" type="datetimeFigureOut">
               <a:rPr lang="en-US" smtClean="0"/>
               <a:pPr/>
-              <a:t>04/09/15</a:t>
+              <a:t>10/09/15</a:t>
             </a:fld>
             <a:endParaRPr lang="en-US" dirty="0"/>
           </a:p>
@@ -3815,7 +5268,7 @@
             <a:fld id="{757B281C-5159-4971-8228-52B9A72E9ED2}" type="datetimeFigureOut">
               <a:rPr lang="en-US" smtClean="0"/>
               <a:pPr/>
-              <a:t>04/09/15</a:t>
+              <a:t>10/09/15</a:t>
             </a:fld>
             <a:endParaRPr lang="en-US" dirty="0"/>
           </a:p>
@@ -4028,7 +5481,7 @@
             <a:fld id="{757B281C-5159-4971-8228-52B9A72E9ED2}" type="datetimeFigureOut">
               <a:rPr lang="en-US" smtClean="0"/>
               <a:pPr/>
-              <a:t>04/09/15</a:t>
+              <a:t>10/09/15</a:t>
             </a:fld>
             <a:endParaRPr lang="en-US" dirty="0"/>
           </a:p>
@@ -10170,7 +11623,7 @@
           <p:nvPr/>
         </p:nvPicPr>
         <p:blipFill>
-          <a:blip r:embed="rId2">
+          <a:blip r:embed="rId3">
             <a:extLst>
               <a:ext uri="{28A0092B-C50C-407E-A947-70E740481C1C}">
                 <a14:useLocalDpi xmlns:a14="http://schemas.microsoft.com/office/drawing/2010/main" val="0"/>
@@ -10200,7 +11653,7 @@
           <p:nvPr/>
         </p:nvPicPr>
         <p:blipFill>
-          <a:blip r:embed="rId3">
+          <a:blip r:embed="rId4">
             <a:extLst>
               <a:ext uri="{28A0092B-C50C-407E-A947-70E740481C1C}">
                 <a14:useLocalDpi xmlns:a14="http://schemas.microsoft.com/office/drawing/2010/main" val="0"/>
@@ -11879,7 +13332,7 @@
           <p:nvPr/>
         </p:nvPicPr>
         <p:blipFill>
-          <a:blip r:embed="rId2">
+          <a:blip r:embed="rId3">
             <a:extLst>
               <a:ext uri="{28A0092B-C50C-407E-A947-70E740481C1C}">
                 <a14:useLocalDpi xmlns:a14="http://schemas.microsoft.com/office/drawing/2010/main" val="0"/>
@@ -11909,7 +13362,7 @@
           <p:nvPr/>
         </p:nvPicPr>
         <p:blipFill>
-          <a:blip r:embed="rId3">
+          <a:blip r:embed="rId4">
             <a:extLst>
               <a:ext uri="{28A0092B-C50C-407E-A947-70E740481C1C}">
                 <a14:useLocalDpi xmlns:a14="http://schemas.microsoft.com/office/drawing/2010/main" val="0"/>
@@ -12523,7 +13976,7 @@
           <p:nvPr/>
         </p:nvPicPr>
         <p:blipFill>
-          <a:blip r:embed="rId2">
+          <a:blip r:embed="rId3">
             <a:extLst>
               <a:ext uri="{28A0092B-C50C-407E-A947-70E740481C1C}">
                 <a14:useLocalDpi xmlns:a14="http://schemas.microsoft.com/office/drawing/2010/main" val="0"/>
@@ -12553,7 +14006,7 @@
           <p:nvPr/>
         </p:nvPicPr>
         <p:blipFill>
-          <a:blip r:embed="rId3">
+          <a:blip r:embed="rId4">
             <a:extLst>
               <a:ext uri="{28A0092B-C50C-407E-A947-70E740481C1C}">
                 <a14:useLocalDpi xmlns:a14="http://schemas.microsoft.com/office/drawing/2010/main" val="0"/>
@@ -13553,31 +15006,8 @@
             </a:r>
           </a:p>
           <a:p>
-            <a:pPr lvl="1"/>
-            <a:endParaRPr lang="en-US" dirty="0" smtClean="0"/>
-          </a:p>
-          <a:p>
-            <a:pPr marL="457200" indent="-457200">
-              <a:buFont typeface="+mj-lt"/>
-              <a:buAutoNum type="arabicPeriod"/>
-            </a:pPr>
-            <a:r>
-              <a:rPr lang="en-US" dirty="0" smtClean="0"/>
-              <a:t>Address </a:t>
-            </a:r>
-            <a:r>
-              <a:rPr lang="en-US" b="1" dirty="0" smtClean="0">
-                <a:solidFill>
-                  <a:srgbClr val="2D72AD"/>
-                </a:solidFill>
-              </a:rPr>
-              <a:t>data and control coupling</a:t>
-            </a:r>
-          </a:p>
-          <a:p>
-            <a:pPr marL="457200" indent="-457200">
-              <a:buFont typeface="+mj-lt"/>
-              <a:buAutoNum type="arabicPeriod"/>
+            <a:pPr marL="0" indent="0">
+              <a:buNone/>
             </a:pPr>
             <a:endParaRPr lang="en-US" b="1" dirty="0" smtClean="0">
               <a:solidFill>

</xml_diff>